<commit_message>
aula 03 cloud computer 16032023
</commit_message>
<xml_diff>
--- a/01 Classes/Aula 02 - Computação em Nuvem e Web Services em Linux.pptx
+++ b/01 Classes/Aula 02 - Computação em Nuvem e Web Services em Linux.pptx
@@ -15,13 +15,13 @@
     <p:sldId id="391" r:id="rId6"/>
     <p:sldId id="405" r:id="rId7"/>
     <p:sldId id="410" r:id="rId8"/>
-    <p:sldId id="333" r:id="rId9"/>
-    <p:sldId id="408" r:id="rId10"/>
-    <p:sldId id="323" r:id="rId11"/>
-    <p:sldId id="334" r:id="rId12"/>
-    <p:sldId id="357" r:id="rId13"/>
-    <p:sldId id="406" r:id="rId14"/>
-    <p:sldId id="407" r:id="rId15"/>
+    <p:sldId id="412" r:id="rId9"/>
+    <p:sldId id="333" r:id="rId10"/>
+    <p:sldId id="408" r:id="rId11"/>
+    <p:sldId id="323" r:id="rId12"/>
+    <p:sldId id="334" r:id="rId13"/>
+    <p:sldId id="411" r:id="rId14"/>
+    <p:sldId id="413" r:id="rId15"/>
     <p:sldId id="337" r:id="rId16"/>
     <p:sldId id="356" r:id="rId17"/>
     <p:sldId id="309" r:id="rId18"/>
@@ -627,7 +627,7 @@
     </p:spTree>
     <p:extLst>
       <p:ext uri="{BB962C8B-B14F-4D97-AF65-F5344CB8AC3E}">
-        <p14:creationId xmlns:p14="http://schemas.microsoft.com/office/powerpoint/2010/main" val="2296249050"/>
+        <p14:creationId xmlns:p14="http://schemas.microsoft.com/office/powerpoint/2010/main" val="2709569597"/>
       </p:ext>
     </p:extLst>
   </p:cSld>
@@ -693,7 +693,7 @@
     </p:spTree>
     <p:extLst>
       <p:ext uri="{BB962C8B-B14F-4D97-AF65-F5344CB8AC3E}">
-        <p14:creationId xmlns:p14="http://schemas.microsoft.com/office/powerpoint/2010/main" val="1692388686"/>
+        <p14:creationId xmlns:p14="http://schemas.microsoft.com/office/powerpoint/2010/main" val="2296249050"/>
       </p:ext>
     </p:extLst>
   </p:cSld>
@@ -759,7 +759,7 @@
     </p:spTree>
     <p:extLst>
       <p:ext uri="{BB962C8B-B14F-4D97-AF65-F5344CB8AC3E}">
-        <p14:creationId xmlns:p14="http://schemas.microsoft.com/office/powerpoint/2010/main" val="2291753345"/>
+        <p14:creationId xmlns:p14="http://schemas.microsoft.com/office/powerpoint/2010/main" val="1692388686"/>
       </p:ext>
     </p:extLst>
   </p:cSld>
@@ -825,7 +825,7 @@
     </p:spTree>
     <p:extLst>
       <p:ext uri="{BB962C8B-B14F-4D97-AF65-F5344CB8AC3E}">
-        <p14:creationId xmlns:p14="http://schemas.microsoft.com/office/powerpoint/2010/main" val="1958798629"/>
+        <p14:creationId xmlns:p14="http://schemas.microsoft.com/office/powerpoint/2010/main" val="2291753345"/>
       </p:ext>
     </p:extLst>
   </p:cSld>
@@ -1353,7 +1353,7 @@
     </p:spTree>
     <p:extLst>
       <p:ext uri="{BB962C8B-B14F-4D97-AF65-F5344CB8AC3E}">
-        <p14:creationId xmlns:p14="http://schemas.microsoft.com/office/powerpoint/2010/main" val="585304384"/>
+        <p14:creationId xmlns:p14="http://schemas.microsoft.com/office/powerpoint/2010/main" val="1097491420"/>
       </p:ext>
     </p:extLst>
   </p:cSld>
@@ -1419,7 +1419,7 @@
     </p:spTree>
     <p:extLst>
       <p:ext uri="{BB962C8B-B14F-4D97-AF65-F5344CB8AC3E}">
-        <p14:creationId xmlns:p14="http://schemas.microsoft.com/office/powerpoint/2010/main" val="3886978698"/>
+        <p14:creationId xmlns:p14="http://schemas.microsoft.com/office/powerpoint/2010/main" val="585304384"/>
       </p:ext>
     </p:extLst>
   </p:cSld>
@@ -1485,7 +1485,7 @@
     </p:spTree>
     <p:extLst>
       <p:ext uri="{BB962C8B-B14F-4D97-AF65-F5344CB8AC3E}">
-        <p14:creationId xmlns:p14="http://schemas.microsoft.com/office/powerpoint/2010/main" val="2709569597"/>
+        <p14:creationId xmlns:p14="http://schemas.microsoft.com/office/powerpoint/2010/main" val="3886978698"/>
       </p:ext>
     </p:extLst>
   </p:cSld>
@@ -4492,7 +4492,7 @@
                   <a:srgbClr val="0070C0"/>
                 </a:solidFill>
               </a:rPr>
-              <a:t>Aprenda</a:t>
+              <a:t>Leitura</a:t>
             </a:r>
             <a:r>
               <a:rPr lang="en-US" b="1" dirty="0">
@@ -4500,8 +4500,21 @@
                   <a:srgbClr val="0070C0"/>
                 </a:solidFill>
               </a:rPr>
-              <a:t>+</a:t>
-            </a:r>
+              <a:t> </a:t>
+            </a:r>
+            <a:r>
+              <a:rPr lang="en-US" b="1" dirty="0" err="1">
+                <a:solidFill>
+                  <a:srgbClr val="0070C0"/>
+                </a:solidFill>
+              </a:rPr>
+              <a:t>Específica</a:t>
+            </a:r>
+            <a:endParaRPr lang="en-US" b="1" dirty="0">
+              <a:solidFill>
+                <a:srgbClr val="0070C0"/>
+              </a:solidFill>
+            </a:endParaRPr>
           </a:p>
         </p:txBody>
       </p:sp>
@@ -4517,8 +4530,8 @@
         </p:nvSpPr>
         <p:spPr>
           <a:xfrm>
-            <a:off x="142865" y="1200150"/>
-            <a:ext cx="8865056" cy="3737370"/>
+            <a:off x="142865" y="1200151"/>
+            <a:ext cx="8865056" cy="3394472"/>
           </a:xfrm>
         </p:spPr>
         <p:txBody>
@@ -4531,11 +4544,25 @@
               <a:buNone/>
             </a:pPr>
             <a:r>
-              <a:rPr lang="pt-BR" sz="2400" dirty="0">
-                <a:latin typeface="Times New Roman" panose="02020603050405020304" pitchFamily="18" charset="0"/>
-                <a:cs typeface="Times New Roman" panose="02020603050405020304" pitchFamily="18" charset="0"/>
-              </a:rPr>
-              <a:t>[1] Cloud Computer – Big Data.</a:t>
+              <a:rPr lang="pt-BR" sz="2000" dirty="0">
+                <a:latin typeface="Times New Roman" panose="02020603050405020304" pitchFamily="18" charset="0"/>
+                <a:cs typeface="Times New Roman" panose="02020603050405020304" pitchFamily="18" charset="0"/>
+              </a:rPr>
+              <a:t>[3] Cloud Computer – Computação Cognitiva (</a:t>
+            </a:r>
+            <a:r>
+              <a:rPr lang="pt-BR" sz="2000" b="1" dirty="0">
+                <a:latin typeface="Times New Roman" panose="02020603050405020304" pitchFamily="18" charset="0"/>
+                <a:cs typeface="Times New Roman" panose="02020603050405020304" pitchFamily="18" charset="0"/>
+              </a:rPr>
+              <a:t>Computação Cognitiva: resultados de uma pesquisa experimental e aplicada em um ambiente virtual de aprendizado (AVA)</a:t>
+            </a:r>
+            <a:r>
+              <a:rPr lang="pt-BR" sz="2000" dirty="0">
+                <a:latin typeface="Times New Roman" panose="02020603050405020304" pitchFamily="18" charset="0"/>
+                <a:cs typeface="Times New Roman" panose="02020603050405020304" pitchFamily="18" charset="0"/>
+              </a:rPr>
+              <a:t>)</a:t>
             </a:r>
           </a:p>
           <a:p>
@@ -4543,7 +4570,7 @@
               <a:buNone/>
             </a:pPr>
             <a:r>
-              <a:rPr lang="pt-BR" sz="2400" b="1" dirty="0">
+              <a:rPr lang="pt-BR" sz="2000" b="1" dirty="0">
                 <a:solidFill>
                   <a:srgbClr val="FF0000"/>
                 </a:solidFill>
@@ -4553,14 +4580,18 @@
               <a:t>Disponível em: </a:t>
             </a:r>
             <a:r>
-              <a:rPr lang="pt-BR" sz="2400" dirty="0">
-                <a:latin typeface="Times New Roman" panose="02020603050405020304" pitchFamily="18" charset="0"/>
-                <a:cs typeface="Times New Roman" panose="02020603050405020304" pitchFamily="18" charset="0"/>
-                <a:hlinkClick r:id="rId3"/>
-              </a:rPr>
-              <a:t>https://www.youtube.com/watch?v=IpfE8B9H9cI</a:t>
-            </a:r>
-            <a:endParaRPr lang="pt-BR" sz="2400" dirty="0">
+              <a:rPr lang="pt-BR" sz="2000" dirty="0">
+                <a:latin typeface="Times New Roman" panose="02020603050405020304" pitchFamily="18" charset="0"/>
+                <a:cs typeface="Times New Roman" panose="02020603050405020304" pitchFamily="18" charset="0"/>
+              </a:rPr>
+              <a:t>https://shre.ink/cI6J</a:t>
+            </a:r>
+          </a:p>
+          <a:p>
+            <a:pPr marL="0" indent="0" algn="just">
+              <a:buNone/>
+            </a:pPr>
+            <a:endParaRPr lang="pt-BR" sz="2000" dirty="0">
               <a:latin typeface="Times New Roman" panose="02020603050405020304" pitchFamily="18" charset="0"/>
               <a:cs typeface="Times New Roman" panose="02020603050405020304" pitchFamily="18" charset="0"/>
             </a:endParaRPr>
@@ -4570,21 +4601,43 @@
               <a:buNone/>
             </a:pPr>
             <a:r>
-              <a:rPr lang="pt-BR" sz="2400" dirty="0">
-                <a:latin typeface="Times New Roman" panose="02020603050405020304" pitchFamily="18" charset="0"/>
-                <a:cs typeface="Times New Roman" panose="02020603050405020304" pitchFamily="18" charset="0"/>
-              </a:rPr>
-              <a:t>			   	  </a:t>
-            </a:r>
-            <a:r>
-              <a:rPr lang="pt-BR" sz="2400" dirty="0">
-                <a:latin typeface="Times New Roman" panose="02020603050405020304" pitchFamily="18" charset="0"/>
-                <a:cs typeface="Times New Roman" panose="02020603050405020304" pitchFamily="18" charset="0"/>
-                <a:hlinkClick r:id="rId4"/>
-              </a:rPr>
-              <a:t>https://www.youtube.com/watch?v=JPC5mE9iI0I</a:t>
-            </a:r>
-            <a:endParaRPr lang="pt-BR" sz="2400" dirty="0">
+              <a:rPr lang="pt-BR" sz="2000">
+                <a:latin typeface="Times New Roman" panose="02020603050405020304" pitchFamily="18" charset="0"/>
+                <a:cs typeface="Times New Roman" panose="02020603050405020304" pitchFamily="18" charset="0"/>
+              </a:rPr>
+              <a:t>[4] </a:t>
+            </a:r>
+            <a:r>
+              <a:rPr lang="pt-BR" sz="2000" dirty="0">
+                <a:latin typeface="Times New Roman" panose="02020603050405020304" pitchFamily="18" charset="0"/>
+                <a:cs typeface="Times New Roman" panose="02020603050405020304" pitchFamily="18" charset="0"/>
+              </a:rPr>
+              <a:t>Cloud Computer – Computação Cognitiva. </a:t>
+            </a:r>
+          </a:p>
+          <a:p>
+            <a:pPr marL="0" indent="0" algn="just">
+              <a:buNone/>
+            </a:pPr>
+            <a:r>
+              <a:rPr lang="pt-BR" sz="2000" b="1" dirty="0">
+                <a:solidFill>
+                  <a:srgbClr val="FF0000"/>
+                </a:solidFill>
+                <a:latin typeface="Times New Roman" panose="02020603050405020304" pitchFamily="18" charset="0"/>
+                <a:cs typeface="Times New Roman" panose="02020603050405020304" pitchFamily="18" charset="0"/>
+              </a:rPr>
+              <a:t>Disponível em: </a:t>
+            </a:r>
+            <a:r>
+              <a:rPr lang="pt-BR" sz="2000" dirty="0">
+                <a:latin typeface="Times New Roman" panose="02020603050405020304" pitchFamily="18" charset="0"/>
+                <a:cs typeface="Times New Roman" panose="02020603050405020304" pitchFamily="18" charset="0"/>
+                <a:hlinkClick r:id="rId3"/>
+              </a:rPr>
+              <a:t>https://revista.ibict.br/fiinf/article/view/5260</a:t>
+            </a:r>
+            <a:endParaRPr lang="pt-BR" sz="2000" dirty="0">
               <a:latin typeface="Times New Roman" panose="02020603050405020304" pitchFamily="18" charset="0"/>
               <a:cs typeface="Times New Roman" panose="02020603050405020304" pitchFamily="18" charset="0"/>
             </a:endParaRPr>
@@ -4593,76 +4646,7 @@
             <a:pPr marL="0" indent="0" algn="just">
               <a:buNone/>
             </a:pPr>
-            <a:r>
-              <a:rPr lang="pt-BR" sz="2400" dirty="0">
-                <a:latin typeface="Times New Roman" panose="02020603050405020304" pitchFamily="18" charset="0"/>
-                <a:cs typeface="Times New Roman" panose="02020603050405020304" pitchFamily="18" charset="0"/>
-              </a:rPr>
-              <a:t>		</a:t>
-            </a:r>
-            <a:r>
-              <a:rPr lang="pt-BR" sz="2400" dirty="0">
-                <a:latin typeface="Times New Roman" panose="02020603050405020304" pitchFamily="18" charset="0"/>
-                <a:cs typeface="Times New Roman" panose="02020603050405020304" pitchFamily="18" charset="0"/>
-                <a:hlinkClick r:id="rId5"/>
-              </a:rPr>
-              <a:t>https://videos.qlik.com/watch/6Fj9ZUNWUc4p9udgzm1u5Z</a:t>
-            </a:r>
-            <a:r>
-              <a:rPr lang="pt-BR" sz="2400" dirty="0">
-                <a:latin typeface="Times New Roman" panose="02020603050405020304" pitchFamily="18" charset="0"/>
-                <a:cs typeface="Times New Roman" panose="02020603050405020304" pitchFamily="18" charset="0"/>
-              </a:rPr>
-              <a:t>?</a:t>
-            </a:r>
-          </a:p>
-          <a:p>
-            <a:pPr marL="0" indent="0" algn="just">
-              <a:buNone/>
-            </a:pPr>
-            <a:r>
-              <a:rPr lang="pt-BR" sz="2400" dirty="0">
-                <a:latin typeface="Times New Roman" panose="02020603050405020304" pitchFamily="18" charset="0"/>
-                <a:cs typeface="Times New Roman" panose="02020603050405020304" pitchFamily="18" charset="0"/>
-              </a:rPr>
-              <a:t>		  </a:t>
-            </a:r>
-          </a:p>
-          <a:p>
-            <a:pPr marL="0" indent="0" algn="just">
-              <a:buNone/>
-            </a:pPr>
-            <a:r>
-              <a:rPr lang="pt-BR" sz="2400" dirty="0">
-                <a:latin typeface="Times New Roman" panose="02020603050405020304" pitchFamily="18" charset="0"/>
-                <a:cs typeface="Times New Roman" panose="02020603050405020304" pitchFamily="18" charset="0"/>
-              </a:rPr>
-              <a:t>[2] Cloud Computer – Computação Cognitiva. </a:t>
-            </a:r>
-          </a:p>
-          <a:p>
-            <a:pPr marL="0" indent="0" algn="just">
-              <a:buNone/>
-            </a:pPr>
-            <a:r>
-              <a:rPr lang="pt-BR" sz="2400" b="1" dirty="0">
-                <a:solidFill>
-                  <a:srgbClr val="FF0000"/>
-                </a:solidFill>
-                <a:latin typeface="Times New Roman" panose="02020603050405020304" pitchFamily="18" charset="0"/>
-                <a:cs typeface="Times New Roman" panose="02020603050405020304" pitchFamily="18" charset="0"/>
-              </a:rPr>
-              <a:t>Disponível em: </a:t>
-            </a:r>
-            <a:r>
-              <a:rPr lang="pt-BR" sz="2400" dirty="0">
-                <a:latin typeface="Times New Roman" panose="02020603050405020304" pitchFamily="18" charset="0"/>
-                <a:cs typeface="Times New Roman" panose="02020603050405020304" pitchFamily="18" charset="0"/>
-                <a:hlinkClick r:id="rId6"/>
-              </a:rPr>
-              <a:t>https://www.youtube.com/watch?v=9RE7oLpyxtE</a:t>
-            </a:r>
-            <a:endParaRPr lang="pt-BR" sz="2400" dirty="0">
+            <a:endParaRPr lang="pt-BR" sz="2000" dirty="0">
               <a:latin typeface="Times New Roman" panose="02020603050405020304" pitchFamily="18" charset="0"/>
               <a:cs typeface="Times New Roman" panose="02020603050405020304" pitchFamily="18" charset="0"/>
             </a:endParaRPr>
@@ -4671,22 +4655,7 @@
             <a:pPr marL="0" indent="0" algn="just">
               <a:buNone/>
             </a:pPr>
-            <a:r>
-              <a:rPr lang="pt-BR" sz="2400" dirty="0">
-                <a:latin typeface="Times New Roman" panose="02020603050405020304" pitchFamily="18" charset="0"/>
-                <a:cs typeface="Times New Roman" panose="02020603050405020304" pitchFamily="18" charset="0"/>
-              </a:rPr>
-              <a:t>				   </a:t>
-            </a:r>
-            <a:r>
-              <a:rPr lang="pt-BR" sz="2400" dirty="0">
-                <a:latin typeface="Times New Roman" panose="02020603050405020304" pitchFamily="18" charset="0"/>
-                <a:cs typeface="Times New Roman" panose="02020603050405020304" pitchFamily="18" charset="0"/>
-                <a:hlinkClick r:id="rId7"/>
-              </a:rPr>
-              <a:t>https://youtu.be/WFR3lOm_xhE</a:t>
-            </a:r>
-            <a:endParaRPr lang="pt-BR" sz="2400" dirty="0">
+            <a:endParaRPr lang="pt-BR" sz="2000" dirty="0">
               <a:latin typeface="Times New Roman" panose="02020603050405020304" pitchFamily="18" charset="0"/>
               <a:cs typeface="Times New Roman" panose="02020603050405020304" pitchFamily="18" charset="0"/>
             </a:endParaRPr>
@@ -4695,9 +4664,26 @@
             <a:pPr marL="0" indent="0" algn="just">
               <a:buNone/>
             </a:pPr>
-            <a:endParaRPr lang="pt-BR" sz="2400" dirty="0">
+            <a:endParaRPr lang="pt-BR" sz="2000" dirty="0">
               <a:latin typeface="Times New Roman" panose="02020603050405020304" pitchFamily="18" charset="0"/>
               <a:cs typeface="Times New Roman" panose="02020603050405020304" pitchFamily="18" charset="0"/>
+            </a:endParaRPr>
+          </a:p>
+          <a:p>
+            <a:pPr marL="0" indent="0" algn="just">
+              <a:buNone/>
+            </a:pPr>
+            <a:endParaRPr lang="pt-BR" sz="2000" dirty="0">
+              <a:latin typeface="Times New Roman" panose="02020603050405020304" pitchFamily="18" charset="0"/>
+              <a:cs typeface="Times New Roman" panose="02020603050405020304" pitchFamily="18" charset="0"/>
+            </a:endParaRPr>
+          </a:p>
+          <a:p>
+            <a:pPr marL="0" indent="0" algn="just">
+              <a:buNone/>
+            </a:pPr>
+            <a:endParaRPr lang="pt-BR" sz="2000" dirty="0">
+              <a:latin typeface="Calibri" panose="020F0502020204030204" pitchFamily="34" charset="0"/>
             </a:endParaRPr>
           </a:p>
         </p:txBody>
@@ -4705,7 +4691,7 @@
     </p:spTree>
     <p:extLst>
       <p:ext uri="{BB962C8B-B14F-4D97-AF65-F5344CB8AC3E}">
-        <p14:creationId xmlns:p14="http://schemas.microsoft.com/office/powerpoint/2010/main" val="2747596967"/>
+        <p14:creationId xmlns:p14="http://schemas.microsoft.com/office/powerpoint/2010/main" val="4175167667"/>
       </p:ext>
     </p:extLst>
   </p:cSld>
@@ -4761,7 +4747,7 @@
                   <a:srgbClr val="0070C0"/>
                 </a:solidFill>
               </a:rPr>
-              <a:t>Dinâmica</a:t>
+              <a:t>Aprenda</a:t>
             </a:r>
             <a:r>
               <a:rPr lang="en-US" b="1" dirty="0">
@@ -4769,21 +4755,8 @@
                   <a:srgbClr val="0070C0"/>
                 </a:solidFill>
               </a:rPr>
-              <a:t>/</a:t>
-            </a:r>
-            <a:r>
-              <a:rPr lang="en-US" b="1" dirty="0" err="1">
-                <a:solidFill>
-                  <a:srgbClr val="0070C0"/>
-                </a:solidFill>
-              </a:rPr>
-              <a:t>Atividades</a:t>
-            </a:r>
-            <a:endParaRPr lang="en-US" b="1" dirty="0">
-              <a:solidFill>
-                <a:srgbClr val="0070C0"/>
-              </a:solidFill>
-            </a:endParaRPr>
+              <a:t>+</a:t>
+            </a:r>
           </a:p>
         </p:txBody>
       </p:sp>
@@ -4799,8 +4772,8 @@
         </p:nvSpPr>
         <p:spPr>
           <a:xfrm>
-            <a:off x="139472" y="1063230"/>
-            <a:ext cx="8865056" cy="3606305"/>
+            <a:off x="142865" y="1200150"/>
+            <a:ext cx="8865056" cy="3737370"/>
           </a:xfrm>
         </p:spPr>
         <p:txBody>
@@ -4813,18 +4786,36 @@
               <a:buNone/>
             </a:pPr>
             <a:r>
-              <a:rPr lang="pt-BR" sz="2000" dirty="0">
-                <a:latin typeface="Times New Roman" panose="02020603050405020304" pitchFamily="18" charset="0"/>
-                <a:cs typeface="Times New Roman" panose="02020603050405020304" pitchFamily="18" charset="0"/>
-              </a:rPr>
-              <a:t>Exercícios (Atividade Verificadora de Aprendizagem)</a:t>
+              <a:rPr lang="pt-BR" sz="2400" dirty="0">
+                <a:latin typeface="Times New Roman" panose="02020603050405020304" pitchFamily="18" charset="0"/>
+                <a:cs typeface="Times New Roman" panose="02020603050405020304" pitchFamily="18" charset="0"/>
+              </a:rPr>
+              <a:t>[1] Cloud Computer – Big Data.</a:t>
             </a:r>
           </a:p>
           <a:p>
             <a:pPr marL="0" indent="0" algn="just">
               <a:buNone/>
             </a:pPr>
-            <a:endParaRPr lang="pt-BR" sz="2000" dirty="0">
+            <a:r>
+              <a:rPr lang="pt-BR" sz="2400" b="1" dirty="0">
+                <a:solidFill>
+                  <a:srgbClr val="FF0000"/>
+                </a:solidFill>
+                <a:latin typeface="Times New Roman" panose="02020603050405020304" pitchFamily="18" charset="0"/>
+                <a:cs typeface="Times New Roman" panose="02020603050405020304" pitchFamily="18" charset="0"/>
+              </a:rPr>
+              <a:t>Disponível em: </a:t>
+            </a:r>
+            <a:r>
+              <a:rPr lang="pt-BR" sz="2400" dirty="0">
+                <a:latin typeface="Times New Roman" panose="02020603050405020304" pitchFamily="18" charset="0"/>
+                <a:cs typeface="Times New Roman" panose="02020603050405020304" pitchFamily="18" charset="0"/>
+                <a:hlinkClick r:id="rId3"/>
+              </a:rPr>
+              <a:t>https://www.youtube.com/watch?v=IpfE8B9H9cI</a:t>
+            </a:r>
+            <a:endParaRPr lang="pt-BR" sz="2400" dirty="0">
               <a:latin typeface="Times New Roman" panose="02020603050405020304" pitchFamily="18" charset="0"/>
               <a:cs typeface="Times New Roman" panose="02020603050405020304" pitchFamily="18" charset="0"/>
             </a:endParaRPr>
@@ -4834,46 +4825,21 @@
               <a:buNone/>
             </a:pPr>
             <a:r>
-              <a:rPr lang="pt-BR" sz="2000" dirty="0">
-                <a:latin typeface="Times New Roman" panose="02020603050405020304" pitchFamily="18" charset="0"/>
-                <a:cs typeface="Times New Roman" panose="02020603050405020304" pitchFamily="18" charset="0"/>
-              </a:rPr>
-              <a:t>1- </a:t>
-            </a:r>
-            <a:r>
-              <a:rPr lang="pt-BR" sz="2000" b="1" dirty="0">
-                <a:latin typeface="Times New Roman" panose="02020603050405020304" pitchFamily="18" charset="0"/>
-                <a:cs typeface="Times New Roman" panose="02020603050405020304" pitchFamily="18" charset="0"/>
-              </a:rPr>
-              <a:t>WSL Ativar a Partir do Windows 10</a:t>
-            </a:r>
-          </a:p>
-          <a:p>
-            <a:pPr marL="0" indent="0" algn="just">
-              <a:buNone/>
-            </a:pPr>
-            <a:r>
-              <a:rPr lang="pt-BR" sz="2000" dirty="0" err="1">
-                <a:latin typeface="Times New Roman" panose="02020603050405020304" pitchFamily="18" charset="0"/>
-                <a:cs typeface="Times New Roman" panose="02020603050405020304" pitchFamily="18" charset="0"/>
-              </a:rPr>
-              <a:t>wsl</a:t>
-            </a:r>
-            <a:r>
-              <a:rPr lang="pt-BR" sz="2000" dirty="0">
-                <a:latin typeface="Times New Roman" panose="02020603050405020304" pitchFamily="18" charset="0"/>
-                <a:cs typeface="Times New Roman" panose="02020603050405020304" pitchFamily="18" charset="0"/>
-              </a:rPr>
-              <a:t> --</a:t>
-            </a:r>
-            <a:r>
-              <a:rPr lang="pt-BR" sz="2000" dirty="0" err="1">
-                <a:latin typeface="Times New Roman" panose="02020603050405020304" pitchFamily="18" charset="0"/>
-                <a:cs typeface="Times New Roman" panose="02020603050405020304" pitchFamily="18" charset="0"/>
-              </a:rPr>
-              <a:t>install</a:t>
-            </a:r>
-            <a:endParaRPr lang="pt-BR" sz="2000" dirty="0">
+              <a:rPr lang="pt-BR" sz="2400" dirty="0">
+                <a:latin typeface="Times New Roman" panose="02020603050405020304" pitchFamily="18" charset="0"/>
+                <a:cs typeface="Times New Roman" panose="02020603050405020304" pitchFamily="18" charset="0"/>
+              </a:rPr>
+              <a:t>			   	  </a:t>
+            </a:r>
+            <a:r>
+              <a:rPr lang="pt-BR" sz="2400" dirty="0">
+                <a:latin typeface="Times New Roman" panose="02020603050405020304" pitchFamily="18" charset="0"/>
+                <a:cs typeface="Times New Roman" panose="02020603050405020304" pitchFamily="18" charset="0"/>
+                <a:hlinkClick r:id="rId4"/>
+              </a:rPr>
+              <a:t>https://www.youtube.com/watch?v=JPC5mE9iI0I</a:t>
+            </a:r>
+            <a:endParaRPr lang="pt-BR" sz="2400" dirty="0">
               <a:latin typeface="Times New Roman" panose="02020603050405020304" pitchFamily="18" charset="0"/>
               <a:cs typeface="Times New Roman" panose="02020603050405020304" pitchFamily="18" charset="0"/>
             </a:endParaRPr>
@@ -4882,7 +4848,76 @@
             <a:pPr marL="0" indent="0" algn="just">
               <a:buNone/>
             </a:pPr>
-            <a:endParaRPr lang="pt-BR" sz="2000" dirty="0">
+            <a:r>
+              <a:rPr lang="pt-BR" sz="2400" dirty="0">
+                <a:latin typeface="Times New Roman" panose="02020603050405020304" pitchFamily="18" charset="0"/>
+                <a:cs typeface="Times New Roman" panose="02020603050405020304" pitchFamily="18" charset="0"/>
+              </a:rPr>
+              <a:t>		</a:t>
+            </a:r>
+            <a:r>
+              <a:rPr lang="pt-BR" sz="2400" dirty="0">
+                <a:latin typeface="Times New Roman" panose="02020603050405020304" pitchFamily="18" charset="0"/>
+                <a:cs typeface="Times New Roman" panose="02020603050405020304" pitchFamily="18" charset="0"/>
+                <a:hlinkClick r:id="rId5"/>
+              </a:rPr>
+              <a:t>https://videos.qlik.com/watch/6Fj9ZUNWUc4p9udgzm1u5Z</a:t>
+            </a:r>
+            <a:r>
+              <a:rPr lang="pt-BR" sz="2400" dirty="0">
+                <a:latin typeface="Times New Roman" panose="02020603050405020304" pitchFamily="18" charset="0"/>
+                <a:cs typeface="Times New Roman" panose="02020603050405020304" pitchFamily="18" charset="0"/>
+              </a:rPr>
+              <a:t>?</a:t>
+            </a:r>
+          </a:p>
+          <a:p>
+            <a:pPr marL="0" indent="0" algn="just">
+              <a:buNone/>
+            </a:pPr>
+            <a:r>
+              <a:rPr lang="pt-BR" sz="2400" dirty="0">
+                <a:latin typeface="Times New Roman" panose="02020603050405020304" pitchFamily="18" charset="0"/>
+                <a:cs typeface="Times New Roman" panose="02020603050405020304" pitchFamily="18" charset="0"/>
+              </a:rPr>
+              <a:t>		  </a:t>
+            </a:r>
+          </a:p>
+          <a:p>
+            <a:pPr marL="0" indent="0" algn="just">
+              <a:buNone/>
+            </a:pPr>
+            <a:r>
+              <a:rPr lang="pt-BR" sz="2400" dirty="0">
+                <a:latin typeface="Times New Roman" panose="02020603050405020304" pitchFamily="18" charset="0"/>
+                <a:cs typeface="Times New Roman" panose="02020603050405020304" pitchFamily="18" charset="0"/>
+              </a:rPr>
+              <a:t>[2] Cloud Computer – Computação Cognitiva. </a:t>
+            </a:r>
+          </a:p>
+          <a:p>
+            <a:pPr marL="0" indent="0" algn="just">
+              <a:buNone/>
+            </a:pPr>
+            <a:r>
+              <a:rPr lang="pt-BR" sz="2400" b="1" dirty="0">
+                <a:solidFill>
+                  <a:srgbClr val="FF0000"/>
+                </a:solidFill>
+                <a:latin typeface="Times New Roman" panose="02020603050405020304" pitchFamily="18" charset="0"/>
+                <a:cs typeface="Times New Roman" panose="02020603050405020304" pitchFamily="18" charset="0"/>
+              </a:rPr>
+              <a:t>Disponível em: </a:t>
+            </a:r>
+            <a:r>
+              <a:rPr lang="pt-BR" sz="2400" dirty="0">
+                <a:latin typeface="Times New Roman" panose="02020603050405020304" pitchFamily="18" charset="0"/>
+                <a:cs typeface="Times New Roman" panose="02020603050405020304" pitchFamily="18" charset="0"/>
+                <a:hlinkClick r:id="rId6"/>
+              </a:rPr>
+              <a:t>https://www.youtube.com/watch?v=9RE7oLpyxtE</a:t>
+            </a:r>
+            <a:endParaRPr lang="pt-BR" sz="2400" dirty="0">
               <a:latin typeface="Times New Roman" panose="02020603050405020304" pitchFamily="18" charset="0"/>
               <a:cs typeface="Times New Roman" panose="02020603050405020304" pitchFamily="18" charset="0"/>
             </a:endParaRPr>
@@ -4892,14 +4927,21 @@
               <a:buNone/>
             </a:pPr>
             <a:r>
-              <a:rPr lang="pt-BR" sz="2000" dirty="0">
-                <a:latin typeface="Times New Roman" panose="02020603050405020304" pitchFamily="18" charset="0"/>
-                <a:cs typeface="Times New Roman" panose="02020603050405020304" pitchFamily="18" charset="0"/>
-                <a:hlinkClick r:id="rId3"/>
-              </a:rPr>
-              <a:t>https://www.alura.com.br/artigos/wsl-executar-programas-comandos-linux-no-windows?gclid=CjwKCAiAr4GgBhBFEiwAgwORrXlzAaJyYmWcGjHARx8DK-sP-J5Ozsht7JXpXlqgS9fQuZ6-fQF6zBoCfxMQAvD_BwE</a:t>
-            </a:r>
-            <a:endParaRPr lang="pt-BR" sz="2000" dirty="0">
+              <a:rPr lang="pt-BR" sz="2400" dirty="0">
+                <a:latin typeface="Times New Roman" panose="02020603050405020304" pitchFamily="18" charset="0"/>
+                <a:cs typeface="Times New Roman" panose="02020603050405020304" pitchFamily="18" charset="0"/>
+              </a:rPr>
+              <a:t>				   </a:t>
+            </a:r>
+            <a:r>
+              <a:rPr lang="pt-BR" sz="2400" dirty="0">
+                <a:latin typeface="Times New Roman" panose="02020603050405020304" pitchFamily="18" charset="0"/>
+                <a:cs typeface="Times New Roman" panose="02020603050405020304" pitchFamily="18" charset="0"/>
+                <a:hlinkClick r:id="rId7"/>
+              </a:rPr>
+              <a:t>https://youtu.be/WFR3lOm_xhE</a:t>
+            </a:r>
+            <a:endParaRPr lang="pt-BR" sz="2400" dirty="0">
               <a:latin typeface="Times New Roman" panose="02020603050405020304" pitchFamily="18" charset="0"/>
               <a:cs typeface="Times New Roman" panose="02020603050405020304" pitchFamily="18" charset="0"/>
             </a:endParaRPr>
@@ -4908,67 +4950,9 @@
             <a:pPr marL="0" indent="0" algn="just">
               <a:buNone/>
             </a:pPr>
-            <a:endParaRPr lang="pt-BR" sz="2000" dirty="0">
+            <a:endParaRPr lang="pt-BR" sz="2400" dirty="0">
               <a:latin typeface="Times New Roman" panose="02020603050405020304" pitchFamily="18" charset="0"/>
               <a:cs typeface="Times New Roman" panose="02020603050405020304" pitchFamily="18" charset="0"/>
-            </a:endParaRPr>
-          </a:p>
-          <a:p>
-            <a:pPr marL="0" indent="0" algn="just">
-              <a:buNone/>
-            </a:pPr>
-            <a:r>
-              <a:rPr lang="pt-BR" sz="2000" dirty="0">
-                <a:latin typeface="Times New Roman" panose="02020603050405020304" pitchFamily="18" charset="0"/>
-                <a:cs typeface="Times New Roman" panose="02020603050405020304" pitchFamily="18" charset="0"/>
-              </a:rPr>
-              <a:t>Abrir terminal </a:t>
-            </a:r>
-            <a:r>
-              <a:rPr lang="pt-BR" sz="2000" dirty="0" err="1">
-                <a:latin typeface="Times New Roman" panose="02020603050405020304" pitchFamily="18" charset="0"/>
-                <a:cs typeface="Times New Roman" panose="02020603050405020304" pitchFamily="18" charset="0"/>
-              </a:rPr>
-              <a:t>PowerShell</a:t>
-            </a:r>
-            <a:r>
-              <a:rPr lang="pt-BR" sz="2000" dirty="0">
-                <a:latin typeface="Times New Roman" panose="02020603050405020304" pitchFamily="18" charset="0"/>
-                <a:cs typeface="Times New Roman" panose="02020603050405020304" pitchFamily="18" charset="0"/>
-              </a:rPr>
-              <a:t> como Administrador</a:t>
-            </a:r>
-          </a:p>
-          <a:p>
-            <a:pPr marL="0" indent="0" algn="just">
-              <a:buNone/>
-            </a:pPr>
-            <a:r>
-              <a:rPr lang="pt-BR" sz="2000" dirty="0">
-                <a:latin typeface="Times New Roman" panose="02020603050405020304" pitchFamily="18" charset="0"/>
-                <a:cs typeface="Times New Roman" panose="02020603050405020304" pitchFamily="18" charset="0"/>
-              </a:rPr>
-              <a:t>	</a:t>
-            </a:r>
-          </a:p>
-          <a:p>
-            <a:pPr algn="just"/>
-            <a:endParaRPr lang="pt-BR" sz="2000" dirty="0">
-              <a:latin typeface="Times New Roman" panose="02020603050405020304" pitchFamily="18" charset="0"/>
-              <a:cs typeface="Times New Roman" panose="02020603050405020304" pitchFamily="18" charset="0"/>
-            </a:endParaRPr>
-          </a:p>
-          <a:p>
-            <a:pPr algn="just"/>
-            <a:endParaRPr lang="pt-BR" sz="2000" dirty="0">
-              <a:latin typeface="Times New Roman" panose="02020603050405020304" pitchFamily="18" charset="0"/>
-              <a:cs typeface="Times New Roman" panose="02020603050405020304" pitchFamily="18" charset="0"/>
-            </a:endParaRPr>
-          </a:p>
-          <a:p>
-            <a:pPr algn="just"/>
-            <a:endParaRPr lang="pt-BR" sz="2000" dirty="0">
-              <a:latin typeface="Calibri" panose="020F0502020204030204" pitchFamily="34" charset="0"/>
             </a:endParaRPr>
           </a:p>
         </p:txBody>
@@ -4976,7 +4960,7 @@
     </p:spTree>
     <p:extLst>
       <p:ext uri="{BB962C8B-B14F-4D97-AF65-F5344CB8AC3E}">
-        <p14:creationId xmlns:p14="http://schemas.microsoft.com/office/powerpoint/2010/main" val="2470652989"/>
+        <p14:creationId xmlns:p14="http://schemas.microsoft.com/office/powerpoint/2010/main" val="2747596967"/>
       </p:ext>
     </p:extLst>
   </p:cSld>
@@ -5105,11 +5089,18 @@
               <a:buNone/>
             </a:pPr>
             <a:r>
+              <a:rPr lang="pt-BR" sz="2000" dirty="0">
+                <a:latin typeface="Times New Roman" panose="02020603050405020304" pitchFamily="18" charset="0"/>
+                <a:cs typeface="Times New Roman" panose="02020603050405020304" pitchFamily="18" charset="0"/>
+              </a:rPr>
+              <a:t>1- </a:t>
+            </a:r>
+            <a:r>
               <a:rPr lang="pt-BR" sz="2000" b="1" dirty="0">
                 <a:latin typeface="Times New Roman" panose="02020603050405020304" pitchFamily="18" charset="0"/>
                 <a:cs typeface="Times New Roman" panose="02020603050405020304" pitchFamily="18" charset="0"/>
               </a:rPr>
-              <a:t>2 -- Plataforma Bohr</a:t>
+              <a:t>WSL Ativar a Partir do Windows 10</a:t>
             </a:r>
           </a:p>
           <a:p>
@@ -5117,12 +5108,30 @@
               <a:buNone/>
             </a:pPr>
             <a:r>
+              <a:rPr lang="pt-BR" sz="2000" dirty="0" err="1">
+                <a:latin typeface="Times New Roman" panose="02020603050405020304" pitchFamily="18" charset="0"/>
+                <a:cs typeface="Times New Roman" panose="02020603050405020304" pitchFamily="18" charset="0"/>
+              </a:rPr>
+              <a:t>wsl</a:t>
+            </a:r>
+            <a:r>
               <a:rPr lang="pt-BR" sz="2000" dirty="0">
                 <a:latin typeface="Times New Roman" panose="02020603050405020304" pitchFamily="18" charset="0"/>
                 <a:cs typeface="Times New Roman" panose="02020603050405020304" pitchFamily="18" charset="0"/>
               </a:rPr>
-              <a:t>https://bohr.io/</a:t>
-            </a:r>
+              <a:t> --</a:t>
+            </a:r>
+            <a:r>
+              <a:rPr lang="pt-BR" sz="2000" dirty="0" err="1">
+                <a:latin typeface="Times New Roman" panose="02020603050405020304" pitchFamily="18" charset="0"/>
+                <a:cs typeface="Times New Roman" panose="02020603050405020304" pitchFamily="18" charset="0"/>
+              </a:rPr>
+              <a:t>install</a:t>
+            </a:r>
+            <a:endParaRPr lang="pt-BR" sz="2000" dirty="0">
+              <a:latin typeface="Times New Roman" panose="02020603050405020304" pitchFamily="18" charset="0"/>
+              <a:cs typeface="Times New Roman" panose="02020603050405020304" pitchFamily="18" charset="0"/>
+            </a:endParaRPr>
           </a:p>
           <a:p>
             <a:pPr marL="0" indent="0" algn="just">
@@ -5141,48 +5150,60 @@
               <a:rPr lang="pt-BR" sz="2000" dirty="0">
                 <a:latin typeface="Times New Roman" panose="02020603050405020304" pitchFamily="18" charset="0"/>
                 <a:cs typeface="Times New Roman" panose="02020603050405020304" pitchFamily="18" charset="0"/>
-              </a:rPr>
-              <a:t>Criar e fazer o </a:t>
+                <a:hlinkClick r:id="rId3"/>
+              </a:rPr>
+              <a:t>https://www.alura.com.br/artigos/wsl-executar-programas-comandos-linux-no-windows?gclid=CjwKCAiAr4GgBhBFEiwAgwORrXlzAaJyYmWcGjHARx8DK-sP-J5Ozsht7JXpXlqgS9fQuZ6-fQF6zBoCfxMQAvD_BwE</a:t>
+            </a:r>
+            <a:endParaRPr lang="pt-BR" sz="2000" dirty="0">
+              <a:latin typeface="Times New Roman" panose="02020603050405020304" pitchFamily="18" charset="0"/>
+              <a:cs typeface="Times New Roman" panose="02020603050405020304" pitchFamily="18" charset="0"/>
+            </a:endParaRPr>
+          </a:p>
+          <a:p>
+            <a:pPr marL="0" indent="0" algn="just">
+              <a:buNone/>
+            </a:pPr>
+            <a:endParaRPr lang="pt-BR" sz="2000" dirty="0">
+              <a:latin typeface="Times New Roman" panose="02020603050405020304" pitchFamily="18" charset="0"/>
+              <a:cs typeface="Times New Roman" panose="02020603050405020304" pitchFamily="18" charset="0"/>
+            </a:endParaRPr>
+          </a:p>
+          <a:p>
+            <a:pPr marL="0" indent="0" algn="just">
+              <a:buNone/>
+            </a:pPr>
+            <a:r>
+              <a:rPr lang="pt-BR" sz="2000" dirty="0">
+                <a:latin typeface="Times New Roman" panose="02020603050405020304" pitchFamily="18" charset="0"/>
+                <a:cs typeface="Times New Roman" panose="02020603050405020304" pitchFamily="18" charset="0"/>
+              </a:rPr>
+              <a:t>Abrir terminal </a:t>
             </a:r>
             <a:r>
               <a:rPr lang="pt-BR" sz="2000" dirty="0" err="1">
                 <a:latin typeface="Times New Roman" panose="02020603050405020304" pitchFamily="18" charset="0"/>
                 <a:cs typeface="Times New Roman" panose="02020603050405020304" pitchFamily="18" charset="0"/>
               </a:rPr>
-              <a:t>deploy</a:t>
+              <a:t>PowerShell</a:t>
             </a:r>
             <a:r>
               <a:rPr lang="pt-BR" sz="2000" dirty="0">
                 <a:latin typeface="Times New Roman" panose="02020603050405020304" pitchFamily="18" charset="0"/>
                 <a:cs typeface="Times New Roman" panose="02020603050405020304" pitchFamily="18" charset="0"/>
               </a:rPr>
-              <a:t> de uma app (</a:t>
-            </a:r>
-            <a:r>
-              <a:rPr lang="pt-BR" sz="2000" dirty="0" err="1">
-                <a:latin typeface="Times New Roman" panose="02020603050405020304" pitchFamily="18" charset="0"/>
-                <a:cs typeface="Times New Roman" panose="02020603050405020304" pitchFamily="18" charset="0"/>
-              </a:rPr>
-              <a:t>template</a:t>
-            </a:r>
+              <a:t> como Administrador</a:t>
+            </a:r>
+          </a:p>
+          <a:p>
+            <a:pPr marL="0" indent="0" algn="just">
+              <a:buNone/>
+            </a:pPr>
             <a:r>
               <a:rPr lang="pt-BR" sz="2000" dirty="0">
                 <a:latin typeface="Times New Roman" panose="02020603050405020304" pitchFamily="18" charset="0"/>
                 <a:cs typeface="Times New Roman" panose="02020603050405020304" pitchFamily="18" charset="0"/>
               </a:rPr>
-              <a:t> livre)</a:t>
-            </a:r>
-          </a:p>
-          <a:p>
-            <a:pPr marL="0" indent="0" algn="just">
-              <a:buNone/>
-            </a:pPr>
-            <a:r>
-              <a:rPr lang="pt-BR" sz="2000" dirty="0">
-                <a:latin typeface="Times New Roman" panose="02020603050405020304" pitchFamily="18" charset="0"/>
-                <a:cs typeface="Times New Roman" panose="02020603050405020304" pitchFamily="18" charset="0"/>
-              </a:rPr>
-              <a:t> </a:t>
+              <a:t>	</a:t>
             </a:r>
           </a:p>
           <a:p>
@@ -5210,7 +5231,7 @@
     </p:spTree>
     <p:extLst>
       <p:ext uri="{BB962C8B-B14F-4D97-AF65-F5344CB8AC3E}">
-        <p14:creationId xmlns:p14="http://schemas.microsoft.com/office/powerpoint/2010/main" val="2995765582"/>
+        <p14:creationId xmlns:p14="http://schemas.microsoft.com/office/powerpoint/2010/main" val="2470652989"/>
       </p:ext>
     </p:extLst>
   </p:cSld>
@@ -5305,7 +5326,7 @@
         <p:spPr>
           <a:xfrm>
             <a:off x="139472" y="1063230"/>
-            <a:ext cx="8865056" cy="3606305"/>
+            <a:ext cx="8865056" cy="3874290"/>
           </a:xfrm>
         </p:spPr>
         <p:txBody>
@@ -5343,21 +5364,86 @@
                 <a:latin typeface="Times New Roman" panose="02020603050405020304" pitchFamily="18" charset="0"/>
                 <a:cs typeface="Times New Roman" panose="02020603050405020304" pitchFamily="18" charset="0"/>
               </a:rPr>
-              <a:t>3 – </a:t>
+              <a:t>2 -- Plataforma Bohr (</a:t>
+            </a:r>
+            <a:r>
+              <a:rPr lang="pt-BR" sz="2000" dirty="0">
+                <a:latin typeface="Times New Roman" panose="02020603050405020304" pitchFamily="18" charset="0"/>
+                <a:cs typeface="Times New Roman" panose="02020603050405020304" pitchFamily="18" charset="0"/>
+                <a:hlinkClick r:id="rId3"/>
+              </a:rPr>
+              <a:t>https://bohr.io/</a:t>
+            </a:r>
+            <a:r>
+              <a:rPr lang="pt-BR" sz="2000" b="1" dirty="0">
+                <a:latin typeface="Times New Roman" panose="02020603050405020304" pitchFamily="18" charset="0"/>
+                <a:cs typeface="Times New Roman" panose="02020603050405020304" pitchFamily="18" charset="0"/>
+              </a:rPr>
+              <a:t>)</a:t>
+            </a:r>
+            <a:r>
+              <a:rPr lang="pt-BR" sz="2000" dirty="0">
+                <a:latin typeface="Times New Roman" panose="02020603050405020304" pitchFamily="18" charset="0"/>
+                <a:cs typeface="Times New Roman" panose="02020603050405020304" pitchFamily="18" charset="0"/>
+              </a:rPr>
+              <a:t> </a:t>
+            </a:r>
+            <a:endParaRPr lang="pt-BR" sz="2000" b="1" dirty="0">
+              <a:latin typeface="Times New Roman" panose="02020603050405020304" pitchFamily="18" charset="0"/>
+              <a:cs typeface="Times New Roman" panose="02020603050405020304" pitchFamily="18" charset="0"/>
+            </a:endParaRPr>
+          </a:p>
+          <a:p>
+            <a:pPr marL="0" indent="0" algn="just">
+              <a:buNone/>
+            </a:pPr>
+            <a:r>
+              <a:rPr lang="pt-BR" sz="2000" dirty="0">
+                <a:latin typeface="Times New Roman" panose="02020603050405020304" pitchFamily="18" charset="0"/>
+                <a:cs typeface="Times New Roman" panose="02020603050405020304" pitchFamily="18" charset="0"/>
+              </a:rPr>
+              <a:t>(Criar e fazer o </a:t>
+            </a:r>
+            <a:r>
+              <a:rPr lang="pt-BR" sz="2000" dirty="0" err="1">
+                <a:latin typeface="Times New Roman" panose="02020603050405020304" pitchFamily="18" charset="0"/>
+                <a:cs typeface="Times New Roman" panose="02020603050405020304" pitchFamily="18" charset="0"/>
+              </a:rPr>
+              <a:t>deploy</a:t>
+            </a:r>
+            <a:r>
+              <a:rPr lang="pt-BR" sz="2000" dirty="0">
+                <a:latin typeface="Times New Roman" panose="02020603050405020304" pitchFamily="18" charset="0"/>
+                <a:cs typeface="Times New Roman" panose="02020603050405020304" pitchFamily="18" charset="0"/>
+              </a:rPr>
+              <a:t> de uma app (</a:t>
             </a:r>
             <a:r>
               <a:rPr lang="pt-BR" sz="2000" b="1" dirty="0" err="1">
-                <a:latin typeface="Times New Roman" panose="02020603050405020304" pitchFamily="18" charset="0"/>
-                <a:cs typeface="Times New Roman" panose="02020603050405020304" pitchFamily="18" charset="0"/>
-              </a:rPr>
-              <a:t>Proxmox</a:t>
+                <a:solidFill>
+                  <a:srgbClr val="FF0000"/>
+                </a:solidFill>
+                <a:latin typeface="Times New Roman" panose="02020603050405020304" pitchFamily="18" charset="0"/>
+                <a:cs typeface="Times New Roman" panose="02020603050405020304" pitchFamily="18" charset="0"/>
+              </a:rPr>
+              <a:t>template</a:t>
             </a:r>
             <a:r>
               <a:rPr lang="pt-BR" sz="2000" b="1" dirty="0">
-                <a:latin typeface="Times New Roman" panose="02020603050405020304" pitchFamily="18" charset="0"/>
-                <a:cs typeface="Times New Roman" panose="02020603050405020304" pitchFamily="18" charset="0"/>
-              </a:rPr>
-              <a:t> VE</a:t>
+                <a:solidFill>
+                  <a:srgbClr val="FF0000"/>
+                </a:solidFill>
+                <a:latin typeface="Times New Roman" panose="02020603050405020304" pitchFamily="18" charset="0"/>
+                <a:cs typeface="Times New Roman" panose="02020603050405020304" pitchFamily="18" charset="0"/>
+              </a:rPr>
+              <a:t> livre</a:t>
+            </a:r>
+            <a:r>
+              <a:rPr lang="pt-BR" sz="2000" dirty="0">
+                <a:latin typeface="Times New Roman" panose="02020603050405020304" pitchFamily="18" charset="0"/>
+                <a:cs typeface="Times New Roman" panose="02020603050405020304" pitchFamily="18" charset="0"/>
+              </a:rPr>
+              <a:t>) )</a:t>
             </a:r>
           </a:p>
           <a:p>
@@ -5368,13 +5454,189 @@
               <a:rPr lang="pt-BR" sz="2000" dirty="0">
                 <a:latin typeface="Times New Roman" panose="02020603050405020304" pitchFamily="18" charset="0"/>
                 <a:cs typeface="Times New Roman" panose="02020603050405020304" pitchFamily="18" charset="0"/>
-                <a:hlinkClick r:id="rId3"/>
-              </a:rPr>
-              <a:t>https://www.proxmox.com/en/</a:t>
+              </a:rPr>
+              <a:t> </a:t>
+            </a:r>
+          </a:p>
+          <a:p>
+            <a:pPr marL="0" indent="0" algn="just">
+              <a:buNone/>
+            </a:pPr>
+            <a:r>
+              <a:rPr lang="pt-BR" sz="2000" b="1" dirty="0">
+                <a:latin typeface="Times New Roman" panose="02020603050405020304" pitchFamily="18" charset="0"/>
+                <a:cs typeface="Times New Roman" panose="02020603050405020304" pitchFamily="18" charset="0"/>
+              </a:rPr>
+              <a:t>3 – Plataforma </a:t>
+            </a:r>
+            <a:r>
+              <a:rPr lang="pt-BR" sz="2000" b="1" dirty="0" err="1">
+                <a:latin typeface="Times New Roman" panose="02020603050405020304" pitchFamily="18" charset="0"/>
+                <a:cs typeface="Times New Roman" panose="02020603050405020304" pitchFamily="18" charset="0"/>
+              </a:rPr>
+              <a:t>Netlify</a:t>
+            </a:r>
+            <a:r>
+              <a:rPr lang="pt-BR" sz="2000" b="1" dirty="0">
+                <a:latin typeface="Times New Roman" panose="02020603050405020304" pitchFamily="18" charset="0"/>
+                <a:cs typeface="Times New Roman" panose="02020603050405020304" pitchFamily="18" charset="0"/>
+              </a:rPr>
+              <a:t> (</a:t>
+            </a:r>
+            <a:r>
+              <a:rPr lang="pt-BR" sz="2000" dirty="0">
+                <a:latin typeface="Times New Roman" panose="02020603050405020304" pitchFamily="18" charset="0"/>
+                <a:cs typeface="Times New Roman" panose="02020603050405020304" pitchFamily="18" charset="0"/>
+                <a:hlinkClick r:id="rId4"/>
+              </a:rPr>
+              <a:t>https://www.netlify.com/</a:t>
+            </a:r>
+            <a:r>
+              <a:rPr lang="pt-BR" sz="2000" dirty="0">
+                <a:latin typeface="Times New Roman" panose="02020603050405020304" pitchFamily="18" charset="0"/>
+                <a:cs typeface="Times New Roman" panose="02020603050405020304" pitchFamily="18" charset="0"/>
+              </a:rPr>
+              <a:t>)</a:t>
+            </a:r>
+            <a:endParaRPr lang="pt-BR" sz="2000" b="1" dirty="0">
+              <a:latin typeface="Times New Roman" panose="02020603050405020304" pitchFamily="18" charset="0"/>
+              <a:cs typeface="Times New Roman" panose="02020603050405020304" pitchFamily="18" charset="0"/>
+            </a:endParaRPr>
+          </a:p>
+          <a:p>
+            <a:pPr marL="0" indent="0" algn="just">
+              <a:buNone/>
+            </a:pPr>
+            <a:r>
+              <a:rPr lang="pt-BR" sz="2000" dirty="0">
+                <a:latin typeface="Times New Roman" panose="02020603050405020304" pitchFamily="18" charset="0"/>
+                <a:cs typeface="Times New Roman" panose="02020603050405020304" pitchFamily="18" charset="0"/>
+                <a:hlinkClick r:id="rId5"/>
+              </a:rPr>
+              <a:t>https://github.com/</a:t>
+            </a:r>
+            <a:r>
+              <a:rPr lang="pt-BR" sz="2000" dirty="0">
+                <a:latin typeface="Times New Roman" panose="02020603050405020304" pitchFamily="18" charset="0"/>
+                <a:cs typeface="Times New Roman" panose="02020603050405020304" pitchFamily="18" charset="0"/>
+              </a:rPr>
+              <a:t> ; </a:t>
+            </a:r>
+            <a:r>
+              <a:rPr lang="pt-BR" sz="2000" dirty="0">
+                <a:latin typeface="Times New Roman" panose="02020603050405020304" pitchFamily="18" charset="0"/>
+                <a:cs typeface="Times New Roman" panose="02020603050405020304" pitchFamily="18" charset="0"/>
+                <a:hlinkClick r:id="rId6"/>
+              </a:rPr>
+              <a:t>https://git-scm.com/downloads</a:t>
             </a:r>
             <a:endParaRPr lang="pt-BR" sz="2000" dirty="0">
               <a:latin typeface="Times New Roman" panose="02020603050405020304" pitchFamily="18" charset="0"/>
               <a:cs typeface="Times New Roman" panose="02020603050405020304" pitchFamily="18" charset="0"/>
+            </a:endParaRPr>
+          </a:p>
+          <a:p>
+            <a:pPr marL="0" indent="0" algn="just">
+              <a:buNone/>
+            </a:pPr>
+            <a:r>
+              <a:rPr lang="pt-BR" sz="2000" dirty="0">
+                <a:latin typeface="Times New Roman" panose="02020603050405020304" pitchFamily="18" charset="0"/>
+                <a:cs typeface="Times New Roman" panose="02020603050405020304" pitchFamily="18" charset="0"/>
+              </a:rPr>
+              <a:t>	Tutorial:	 </a:t>
+            </a:r>
+            <a:r>
+              <a:rPr lang="pt-BR" sz="2000" dirty="0">
+                <a:latin typeface="Times New Roman" panose="02020603050405020304" pitchFamily="18" charset="0"/>
+                <a:cs typeface="Times New Roman" panose="02020603050405020304" pitchFamily="18" charset="0"/>
+                <a:hlinkClick r:id="rId7"/>
+              </a:rPr>
+              <a:t>https://ostechnix.com/what-is-git-and-how-to-install-git-in-linux/</a:t>
+            </a:r>
+            <a:endParaRPr lang="pt-BR" sz="2000" dirty="0">
+              <a:latin typeface="Times New Roman" panose="02020603050405020304" pitchFamily="18" charset="0"/>
+              <a:cs typeface="Times New Roman" panose="02020603050405020304" pitchFamily="18" charset="0"/>
+            </a:endParaRPr>
+          </a:p>
+          <a:p>
+            <a:pPr marL="0" indent="0" algn="just">
+              <a:buNone/>
+            </a:pPr>
+            <a:r>
+              <a:rPr lang="pt-BR" sz="2000" dirty="0">
+                <a:latin typeface="Times New Roman" panose="02020603050405020304" pitchFamily="18" charset="0"/>
+                <a:cs typeface="Times New Roman" panose="02020603050405020304" pitchFamily="18" charset="0"/>
+              </a:rPr>
+              <a:t>			 </a:t>
+            </a:r>
+            <a:r>
+              <a:rPr lang="pt-BR" sz="2000" dirty="0">
+                <a:latin typeface="Times New Roman" panose="02020603050405020304" pitchFamily="18" charset="0"/>
+                <a:cs typeface="Times New Roman" panose="02020603050405020304" pitchFamily="18" charset="0"/>
+                <a:hlinkClick r:id="rId8"/>
+              </a:rPr>
+              <a:t>https://chiamakaikeanyi.dev/working-with-git/</a:t>
+            </a:r>
+            <a:endParaRPr lang="pt-BR" sz="2000" dirty="0">
+              <a:latin typeface="Times New Roman" panose="02020603050405020304" pitchFamily="18" charset="0"/>
+              <a:cs typeface="Times New Roman" panose="02020603050405020304" pitchFamily="18" charset="0"/>
+            </a:endParaRPr>
+          </a:p>
+          <a:p>
+            <a:pPr marL="0" indent="0" algn="just">
+              <a:buNone/>
+            </a:pPr>
+            <a:r>
+              <a:rPr lang="pt-BR" sz="2000" dirty="0">
+                <a:latin typeface="Times New Roman" panose="02020603050405020304" pitchFamily="18" charset="0"/>
+                <a:cs typeface="Times New Roman" panose="02020603050405020304" pitchFamily="18" charset="0"/>
+              </a:rPr>
+              <a:t>Criar e fazer o </a:t>
+            </a:r>
+            <a:r>
+              <a:rPr lang="pt-BR" sz="2000" dirty="0" err="1">
+                <a:latin typeface="Times New Roman" panose="02020603050405020304" pitchFamily="18" charset="0"/>
+                <a:cs typeface="Times New Roman" panose="02020603050405020304" pitchFamily="18" charset="0"/>
+              </a:rPr>
+              <a:t>deploy</a:t>
+            </a:r>
+            <a:r>
+              <a:rPr lang="pt-BR" sz="2000" dirty="0">
+                <a:latin typeface="Times New Roman" panose="02020603050405020304" pitchFamily="18" charset="0"/>
+                <a:cs typeface="Times New Roman" panose="02020603050405020304" pitchFamily="18" charset="0"/>
+              </a:rPr>
+              <a:t> de uma app (</a:t>
+            </a:r>
+            <a:r>
+              <a:rPr lang="pt-BR" sz="2000" b="1" dirty="0" err="1">
+                <a:solidFill>
+                  <a:srgbClr val="FF0000"/>
+                </a:solidFill>
+                <a:latin typeface="Times New Roman" panose="02020603050405020304" pitchFamily="18" charset="0"/>
+                <a:cs typeface="Times New Roman" panose="02020603050405020304" pitchFamily="18" charset="0"/>
+              </a:rPr>
+              <a:t>template</a:t>
+            </a:r>
+            <a:r>
+              <a:rPr lang="pt-BR" sz="2000" b="1" dirty="0">
+                <a:solidFill>
+                  <a:srgbClr val="FF0000"/>
+                </a:solidFill>
+                <a:latin typeface="Times New Roman" panose="02020603050405020304" pitchFamily="18" charset="0"/>
+                <a:cs typeface="Times New Roman" panose="02020603050405020304" pitchFamily="18" charset="0"/>
+              </a:rPr>
+              <a:t> livre</a:t>
+            </a:r>
+            <a:r>
+              <a:rPr lang="pt-BR" sz="2000" dirty="0">
+                <a:latin typeface="Times New Roman" panose="02020603050405020304" pitchFamily="18" charset="0"/>
+                <a:cs typeface="Times New Roman" panose="02020603050405020304" pitchFamily="18" charset="0"/>
+              </a:rPr>
+              <a:t>)</a:t>
+            </a:r>
+            <a:endParaRPr lang="pt-BR" sz="2000" dirty="0">
+              <a:latin typeface="Calibri" panose="020F0502020204030204" pitchFamily="34" charset="0"/>
             </a:endParaRPr>
           </a:p>
           <a:p>
@@ -5387,53 +5649,6 @@
             </a:endParaRPr>
           </a:p>
           <a:p>
-            <a:pPr marL="0" indent="0" algn="just">
-              <a:buNone/>
-            </a:pPr>
-            <a:r>
-              <a:rPr lang="pt-BR" sz="2000" dirty="0">
-                <a:latin typeface="Times New Roman" panose="02020603050405020304" pitchFamily="18" charset="0"/>
-                <a:cs typeface="Times New Roman" panose="02020603050405020304" pitchFamily="18" charset="0"/>
-                <a:hlinkClick r:id="rId4"/>
-              </a:rPr>
-              <a:t>https://www.vivaolinux.com.br/artigo/Virtualizacao-com-Proxmox-VE</a:t>
-            </a:r>
-            <a:endParaRPr lang="pt-BR" sz="2000" dirty="0">
-              <a:latin typeface="Times New Roman" panose="02020603050405020304" pitchFamily="18" charset="0"/>
-              <a:cs typeface="Times New Roman" panose="02020603050405020304" pitchFamily="18" charset="0"/>
-            </a:endParaRPr>
-          </a:p>
-          <a:p>
-            <a:pPr marL="0" indent="0" algn="just">
-              <a:buNone/>
-            </a:pPr>
-            <a:endParaRPr lang="pt-BR" sz="2000" dirty="0">
-              <a:latin typeface="Times New Roman" panose="02020603050405020304" pitchFamily="18" charset="0"/>
-              <a:cs typeface="Times New Roman" panose="02020603050405020304" pitchFamily="18" charset="0"/>
-            </a:endParaRPr>
-          </a:p>
-          <a:p>
-            <a:pPr marL="0" indent="0" algn="just">
-              <a:buNone/>
-            </a:pPr>
-            <a:r>
-              <a:rPr lang="pt-BR" sz="2000" dirty="0">
-                <a:latin typeface="Times New Roman" panose="02020603050405020304" pitchFamily="18" charset="0"/>
-                <a:cs typeface="Times New Roman" panose="02020603050405020304" pitchFamily="18" charset="0"/>
-              </a:rPr>
-              <a:t>Criar VM e acessar pela Conexão de Área de Trabalho Remota</a:t>
-            </a:r>
-          </a:p>
-          <a:p>
-            <a:pPr marL="0" indent="0" algn="just">
-              <a:buNone/>
-            </a:pPr>
-            <a:endParaRPr lang="pt-BR" sz="2000" dirty="0">
-              <a:latin typeface="Times New Roman" panose="02020603050405020304" pitchFamily="18" charset="0"/>
-              <a:cs typeface="Times New Roman" panose="02020603050405020304" pitchFamily="18" charset="0"/>
-            </a:endParaRPr>
-          </a:p>
-          <a:p>
             <a:pPr algn="just"/>
             <a:endParaRPr lang="pt-BR" sz="2000" dirty="0">
               <a:latin typeface="Times New Roman" panose="02020603050405020304" pitchFamily="18" charset="0"/>
@@ -5451,7 +5666,7 @@
     </p:spTree>
     <p:extLst>
       <p:ext uri="{BB962C8B-B14F-4D97-AF65-F5344CB8AC3E}">
-        <p14:creationId xmlns:p14="http://schemas.microsoft.com/office/powerpoint/2010/main" val="3105658161"/>
+        <p14:creationId xmlns:p14="http://schemas.microsoft.com/office/powerpoint/2010/main" val="2479183747"/>
       </p:ext>
     </p:extLst>
   </p:cSld>
@@ -5546,7 +5761,7 @@
         <p:spPr>
           <a:xfrm>
             <a:off x="139472" y="1063230"/>
-            <a:ext cx="8865056" cy="3874290"/>
+            <a:ext cx="8865056" cy="3606305"/>
           </a:xfrm>
         </p:spPr>
         <p:txBody>
@@ -5584,19 +5799,53 @@
                 <a:latin typeface="Times New Roman" panose="02020603050405020304" pitchFamily="18" charset="0"/>
                 <a:cs typeface="Times New Roman" panose="02020603050405020304" pitchFamily="18" charset="0"/>
               </a:rPr>
-              <a:t>4 – Plataforma </a:t>
+              <a:t>4 – </a:t>
             </a:r>
             <a:r>
               <a:rPr lang="pt-BR" sz="2000" b="1" dirty="0" err="1">
                 <a:latin typeface="Times New Roman" panose="02020603050405020304" pitchFamily="18" charset="0"/>
                 <a:cs typeface="Times New Roman" panose="02020603050405020304" pitchFamily="18" charset="0"/>
               </a:rPr>
-              <a:t>Netlify</a:t>
-            </a:r>
-            <a:endParaRPr lang="pt-BR" sz="2000" b="1" dirty="0">
-              <a:latin typeface="Times New Roman" panose="02020603050405020304" pitchFamily="18" charset="0"/>
-              <a:cs typeface="Times New Roman" panose="02020603050405020304" pitchFamily="18" charset="0"/>
-            </a:endParaRPr>
+              <a:t>Proxmox</a:t>
+            </a:r>
+            <a:r>
+              <a:rPr lang="pt-BR" sz="2000" b="1" dirty="0">
+                <a:latin typeface="Times New Roman" panose="02020603050405020304" pitchFamily="18" charset="0"/>
+                <a:cs typeface="Times New Roman" panose="02020603050405020304" pitchFamily="18" charset="0"/>
+              </a:rPr>
+              <a:t> VE (</a:t>
+            </a:r>
+            <a:r>
+              <a:rPr lang="pt-BR" sz="2000" dirty="0">
+                <a:latin typeface="Times New Roman" panose="02020603050405020304" pitchFamily="18" charset="0"/>
+                <a:cs typeface="Times New Roman" panose="02020603050405020304" pitchFamily="18" charset="0"/>
+                <a:hlinkClick r:id="rId3"/>
+              </a:rPr>
+              <a:t>https://www.proxmox.com/</a:t>
+            </a:r>
+            <a:r>
+              <a:rPr lang="pt-BR" sz="2000" dirty="0" err="1">
+                <a:latin typeface="Times New Roman" panose="02020603050405020304" pitchFamily="18" charset="0"/>
+                <a:cs typeface="Times New Roman" panose="02020603050405020304" pitchFamily="18" charset="0"/>
+                <a:hlinkClick r:id="rId3"/>
+              </a:rPr>
+              <a:t>en</a:t>
+            </a:r>
+            <a:r>
+              <a:rPr lang="pt-BR" sz="2000" dirty="0">
+                <a:latin typeface="Times New Roman" panose="02020603050405020304" pitchFamily="18" charset="0"/>
+                <a:cs typeface="Times New Roman" panose="02020603050405020304" pitchFamily="18" charset="0"/>
+                <a:hlinkClick r:id="rId3"/>
+              </a:rPr>
+              <a:t>/</a:t>
+            </a:r>
+            <a:r>
+              <a:rPr lang="pt-BR" sz="2000" b="1" dirty="0">
+                <a:latin typeface="Times New Roman" panose="02020603050405020304" pitchFamily="18" charset="0"/>
+                <a:cs typeface="Times New Roman" panose="02020603050405020304" pitchFamily="18" charset="0"/>
+              </a:rPr>
+              <a:t>)</a:t>
+            </a:r>
           </a:p>
           <a:p>
             <a:pPr marL="0" indent="0" algn="just">
@@ -5606,9 +5855,9 @@
               <a:rPr lang="pt-BR" sz="2000" dirty="0">
                 <a:latin typeface="Times New Roman" panose="02020603050405020304" pitchFamily="18" charset="0"/>
                 <a:cs typeface="Times New Roman" panose="02020603050405020304" pitchFamily="18" charset="0"/>
-                <a:hlinkClick r:id="rId3"/>
-              </a:rPr>
-              <a:t>https://github.com/</a:t>
+                <a:hlinkClick r:id="rId4"/>
+              </a:rPr>
+              <a:t>https://www.vivaolinux.com.br/artigo/Virtualizacao-com-Proxmox-VE</a:t>
             </a:r>
             <a:endParaRPr lang="pt-BR" sz="2000" dirty="0">
               <a:latin typeface="Times New Roman" panose="02020603050405020304" pitchFamily="18" charset="0"/>
@@ -5623,79 +5872,9 @@
               <a:rPr lang="pt-BR" sz="2000" dirty="0">
                 <a:latin typeface="Times New Roman" panose="02020603050405020304" pitchFamily="18" charset="0"/>
                 <a:cs typeface="Times New Roman" panose="02020603050405020304" pitchFamily="18" charset="0"/>
-                <a:hlinkClick r:id="rId4"/>
-              </a:rPr>
-              <a:t>https://git-scm.com/downloads</a:t>
-            </a:r>
-            <a:endParaRPr lang="pt-BR" sz="2000" dirty="0">
-              <a:latin typeface="Times New Roman" panose="02020603050405020304" pitchFamily="18" charset="0"/>
-              <a:cs typeface="Times New Roman" panose="02020603050405020304" pitchFamily="18" charset="0"/>
-            </a:endParaRPr>
-          </a:p>
-          <a:p>
-            <a:pPr marL="0" indent="0" algn="just">
-              <a:buNone/>
-            </a:pPr>
-            <a:r>
-              <a:rPr lang="pt-BR" sz="2000" dirty="0">
-                <a:latin typeface="Times New Roman" panose="02020603050405020304" pitchFamily="18" charset="0"/>
-                <a:cs typeface="Times New Roman" panose="02020603050405020304" pitchFamily="18" charset="0"/>
-              </a:rPr>
-              <a:t>	Tutorial:	 </a:t>
-            </a:r>
-            <a:r>
-              <a:rPr lang="pt-BR" sz="2000" dirty="0">
-                <a:latin typeface="Times New Roman" panose="02020603050405020304" pitchFamily="18" charset="0"/>
-                <a:cs typeface="Times New Roman" panose="02020603050405020304" pitchFamily="18" charset="0"/>
-                <a:hlinkClick r:id="rId5"/>
-              </a:rPr>
-              <a:t>https://ostechnix.com/what-is-git-and-how-to-install-git-in-linux/</a:t>
-            </a:r>
-            <a:endParaRPr lang="pt-BR" sz="2000" dirty="0">
-              <a:latin typeface="Times New Roman" panose="02020603050405020304" pitchFamily="18" charset="0"/>
-              <a:cs typeface="Times New Roman" panose="02020603050405020304" pitchFamily="18" charset="0"/>
-            </a:endParaRPr>
-          </a:p>
-          <a:p>
-            <a:pPr marL="0" indent="0" algn="just">
-              <a:buNone/>
-            </a:pPr>
-            <a:r>
-              <a:rPr lang="pt-BR" sz="2000" dirty="0">
-                <a:latin typeface="Times New Roman" panose="02020603050405020304" pitchFamily="18" charset="0"/>
-                <a:cs typeface="Times New Roman" panose="02020603050405020304" pitchFamily="18" charset="0"/>
-              </a:rPr>
-              <a:t>			 </a:t>
-            </a:r>
-            <a:r>
-              <a:rPr lang="pt-BR" sz="2000" dirty="0">
-                <a:latin typeface="Times New Roman" panose="02020603050405020304" pitchFamily="18" charset="0"/>
-                <a:cs typeface="Times New Roman" panose="02020603050405020304" pitchFamily="18" charset="0"/>
-                <a:hlinkClick r:id="rId6"/>
-              </a:rPr>
-              <a:t>https://chiamakaikeanyi.dev/working-with-git/</a:t>
-            </a:r>
-            <a:endParaRPr lang="pt-BR" sz="2000" dirty="0">
-              <a:latin typeface="Times New Roman" panose="02020603050405020304" pitchFamily="18" charset="0"/>
-              <a:cs typeface="Times New Roman" panose="02020603050405020304" pitchFamily="18" charset="0"/>
-            </a:endParaRPr>
-          </a:p>
-          <a:p>
-            <a:pPr marL="0" indent="0" algn="just">
-              <a:buNone/>
-            </a:pPr>
-            <a:r>
-              <a:rPr lang="pt-BR" sz="2000" dirty="0">
-                <a:latin typeface="Times New Roman" panose="02020603050405020304" pitchFamily="18" charset="0"/>
-                <a:cs typeface="Times New Roman" panose="02020603050405020304" pitchFamily="18" charset="0"/>
-                <a:hlinkClick r:id="rId7"/>
-              </a:rPr>
-              <a:t>https://www.netlify.com/</a:t>
-            </a:r>
-            <a:endParaRPr lang="pt-BR" sz="2000" dirty="0">
-              <a:latin typeface="Times New Roman" panose="02020603050405020304" pitchFamily="18" charset="0"/>
-              <a:cs typeface="Times New Roman" panose="02020603050405020304" pitchFamily="18" charset="0"/>
-            </a:endParaRPr>
+              </a:rPr>
+              <a:t>Criar VM</a:t>
+            </a:r>
           </a:p>
           <a:p>
             <a:pPr marL="0" indent="0" algn="just">
@@ -5711,39 +5890,52 @@
               <a:buNone/>
             </a:pPr>
             <a:r>
+              <a:rPr lang="pt-BR" sz="2000" b="1" dirty="0">
+                <a:latin typeface="Times New Roman" panose="02020603050405020304" pitchFamily="18" charset="0"/>
+                <a:cs typeface="Times New Roman" panose="02020603050405020304" pitchFamily="18" charset="0"/>
+              </a:rPr>
+              <a:t>5 – </a:t>
+            </a:r>
+            <a:r>
+              <a:rPr lang="pt-BR" sz="2000" b="1" dirty="0" err="1">
+                <a:latin typeface="Times New Roman" panose="02020603050405020304" pitchFamily="18" charset="0"/>
+                <a:cs typeface="Times New Roman" panose="02020603050405020304" pitchFamily="18" charset="0"/>
+              </a:rPr>
+              <a:t>VirtualBox</a:t>
+            </a:r>
+            <a:r>
+              <a:rPr lang="pt-BR" sz="2000" b="1" dirty="0">
+                <a:latin typeface="Times New Roman" panose="02020603050405020304" pitchFamily="18" charset="0"/>
+                <a:cs typeface="Times New Roman" panose="02020603050405020304" pitchFamily="18" charset="0"/>
+              </a:rPr>
+              <a:t> (</a:t>
+            </a:r>
+            <a:r>
               <a:rPr lang="pt-BR" sz="2000" dirty="0">
                 <a:latin typeface="Times New Roman" panose="02020603050405020304" pitchFamily="18" charset="0"/>
                 <a:cs typeface="Times New Roman" panose="02020603050405020304" pitchFamily="18" charset="0"/>
-              </a:rPr>
-              <a:t>Criar e fazer o </a:t>
-            </a:r>
-            <a:r>
-              <a:rPr lang="pt-BR" sz="2000" dirty="0" err="1">
-                <a:latin typeface="Times New Roman" panose="02020603050405020304" pitchFamily="18" charset="0"/>
-                <a:cs typeface="Times New Roman" panose="02020603050405020304" pitchFamily="18" charset="0"/>
-              </a:rPr>
-              <a:t>deploy</a:t>
-            </a:r>
+                <a:hlinkClick r:id="rId5"/>
+              </a:rPr>
+              <a:t>https://www.virtualbox.org/</a:t>
+            </a:r>
+            <a:r>
+              <a:rPr lang="pt-BR" sz="2000" b="1" dirty="0">
+                <a:latin typeface="Times New Roman" panose="02020603050405020304" pitchFamily="18" charset="0"/>
+                <a:cs typeface="Times New Roman" panose="02020603050405020304" pitchFamily="18" charset="0"/>
+              </a:rPr>
+              <a:t>)</a:t>
+            </a:r>
+          </a:p>
+          <a:p>
+            <a:pPr marL="0" indent="0" algn="just">
+              <a:buNone/>
+            </a:pPr>
             <a:r>
               <a:rPr lang="pt-BR" sz="2000" dirty="0">
                 <a:latin typeface="Times New Roman" panose="02020603050405020304" pitchFamily="18" charset="0"/>
                 <a:cs typeface="Times New Roman" panose="02020603050405020304" pitchFamily="18" charset="0"/>
               </a:rPr>
-              <a:t> de uma app (</a:t>
-            </a:r>
-            <a:r>
-              <a:rPr lang="pt-BR" sz="2000" dirty="0" err="1">
-                <a:latin typeface="Times New Roman" panose="02020603050405020304" pitchFamily="18" charset="0"/>
-                <a:cs typeface="Times New Roman" panose="02020603050405020304" pitchFamily="18" charset="0"/>
-              </a:rPr>
-              <a:t>template</a:t>
-            </a:r>
-            <a:r>
-              <a:rPr lang="pt-BR" sz="2000" dirty="0">
-                <a:latin typeface="Times New Roman" panose="02020603050405020304" pitchFamily="18" charset="0"/>
-                <a:cs typeface="Times New Roman" panose="02020603050405020304" pitchFamily="18" charset="0"/>
-              </a:rPr>
-              <a:t> livre)</a:t>
+              <a:t>Criar VM no laboratório de TI</a:t>
             </a:r>
             <a:endParaRPr lang="pt-BR" sz="2000" dirty="0">
               <a:latin typeface="Calibri" panose="020F0502020204030204" pitchFamily="34" charset="0"/>
@@ -5754,7 +5946,7 @@
     </p:spTree>
     <p:extLst>
       <p:ext uri="{BB962C8B-B14F-4D97-AF65-F5344CB8AC3E}">
-        <p14:creationId xmlns:p14="http://schemas.microsoft.com/office/powerpoint/2010/main" val="3406393933"/>
+        <p14:creationId xmlns:p14="http://schemas.microsoft.com/office/powerpoint/2010/main" val="2882920367"/>
       </p:ext>
     </p:extLst>
   </p:cSld>
@@ -8451,14 +8643,14 @@
               <a:buChar char="ü"/>
             </a:pPr>
             <a:r>
-              <a:rPr lang="pt-BR" sz="2000" dirty="0">
+              <a:rPr lang="pt-BR" sz="1800" dirty="0">
                 <a:latin typeface="Times" panose="02020603050405020304" pitchFamily="18" charset="0"/>
                 <a:cs typeface="Times New Roman" panose="02020603050405020304" pitchFamily="18" charset="0"/>
                 <a:hlinkClick r:id="rId3"/>
               </a:rPr>
               <a:t>https://www.datascienceacademy.com.br/todoscursosdsa</a:t>
             </a:r>
-            <a:endParaRPr lang="pt-BR" sz="2000" dirty="0">
+            <a:endParaRPr lang="pt-BR" sz="1800" dirty="0">
               <a:latin typeface="Times" panose="02020603050405020304" pitchFamily="18" charset="0"/>
               <a:cs typeface="Times New Roman" panose="02020603050405020304" pitchFamily="18" charset="0"/>
             </a:endParaRPr>
@@ -8469,14 +8661,14 @@
               <a:buChar char="ü"/>
             </a:pPr>
             <a:r>
-              <a:rPr lang="pt-BR" sz="2000" dirty="0">
+              <a:rPr lang="pt-BR" sz="1800" dirty="0">
                 <a:latin typeface="Times" panose="02020603050405020304" pitchFamily="18" charset="0"/>
                 <a:cs typeface="Times New Roman" panose="02020603050405020304" pitchFamily="18" charset="0"/>
                 <a:hlinkClick r:id="rId4"/>
               </a:rPr>
               <a:t>https://pt.coursera.org/specializations/big-data</a:t>
             </a:r>
-            <a:endParaRPr lang="pt-BR" sz="2000" dirty="0">
+            <a:endParaRPr lang="pt-BR" sz="1800" dirty="0">
               <a:latin typeface="Times" panose="02020603050405020304" pitchFamily="18" charset="0"/>
               <a:cs typeface="Times New Roman" panose="02020603050405020304" pitchFamily="18" charset="0"/>
             </a:endParaRPr>
@@ -8487,17 +8679,37 @@
               <a:buChar char="ü"/>
             </a:pPr>
             <a:r>
-              <a:rPr lang="pt-BR" sz="2000" dirty="0">
+              <a:rPr lang="pt-BR" sz="1800" dirty="0">
                 <a:latin typeface="Times" panose="02020603050405020304" pitchFamily="18" charset="0"/>
                 <a:cs typeface="Times New Roman" panose="02020603050405020304" pitchFamily="18" charset="0"/>
                 <a:hlinkClick r:id="rId5"/>
               </a:rPr>
               <a:t>https://www.udemy.com/</a:t>
             </a:r>
-            <a:endParaRPr lang="pt-BR" sz="2000" dirty="0">
-              <a:latin typeface="Times" panose="02020603050405020304" pitchFamily="18" charset="0"/>
-              <a:cs typeface="Times New Roman" panose="02020603050405020304" pitchFamily="18" charset="0"/>
-            </a:endParaRPr>
+            <a:r>
+              <a:rPr lang="pt-BR" sz="1800" dirty="0">
+                <a:latin typeface="Times" panose="02020603050405020304" pitchFamily="18" charset="0"/>
+                <a:cs typeface="Times New Roman" panose="02020603050405020304" pitchFamily="18" charset="0"/>
+              </a:rPr>
+              <a:t> (</a:t>
+            </a:r>
+            <a:r>
+              <a:rPr lang="pt-BR" sz="1800" b="1" dirty="0">
+                <a:solidFill>
+                  <a:srgbClr val="FF0000"/>
+                </a:solidFill>
+                <a:latin typeface="Times" panose="02020603050405020304" pitchFamily="18" charset="0"/>
+                <a:cs typeface="Times New Roman" panose="02020603050405020304" pitchFamily="18" charset="0"/>
+              </a:rPr>
+              <a:t>Azure AZ-900 gratuito</a:t>
+            </a:r>
+            <a:r>
+              <a:rPr lang="pt-BR" sz="1800" dirty="0">
+                <a:latin typeface="Times" panose="02020603050405020304" pitchFamily="18" charset="0"/>
+                <a:cs typeface="Times New Roman" panose="02020603050405020304" pitchFamily="18" charset="0"/>
+              </a:rPr>
+              <a:t>)</a:t>
+            </a:r>
           </a:p>
           <a:p>
             <a:pPr algn="just">
@@ -8505,14 +8717,14 @@
               <a:buChar char="ü"/>
             </a:pPr>
             <a:r>
-              <a:rPr lang="pt-BR" sz="2000" dirty="0">
+              <a:rPr lang="pt-BR" sz="1800" dirty="0">
                 <a:latin typeface="Times" panose="02020603050405020304" pitchFamily="18" charset="0"/>
                 <a:cs typeface="Times New Roman" panose="02020603050405020304" pitchFamily="18" charset="0"/>
                 <a:hlinkClick r:id="rId6"/>
               </a:rPr>
               <a:t>https://www.udacity.com/enterprise/cloud-computing</a:t>
             </a:r>
-            <a:endParaRPr lang="pt-BR" sz="2000" dirty="0">
+            <a:endParaRPr lang="pt-BR" sz="1800" dirty="0">
               <a:latin typeface="Times" panose="02020603050405020304" pitchFamily="18" charset="0"/>
               <a:cs typeface="Times New Roman" panose="02020603050405020304" pitchFamily="18" charset="0"/>
             </a:endParaRPr>
@@ -8523,14 +8735,14 @@
               <a:buChar char="ü"/>
             </a:pPr>
             <a:r>
-              <a:rPr lang="pt-BR" sz="2000" dirty="0">
+              <a:rPr lang="pt-BR" sz="1800" dirty="0">
                 <a:latin typeface="Times" panose="02020603050405020304" pitchFamily="18" charset="0"/>
                 <a:cs typeface="Times New Roman" panose="02020603050405020304" pitchFamily="18" charset="0"/>
                 <a:hlinkClick r:id="rId7"/>
               </a:rPr>
               <a:t>https://www.datacamp.com/courses/introduction-to-power-bi</a:t>
             </a:r>
-            <a:endParaRPr lang="pt-BR" sz="2000" dirty="0">
+            <a:endParaRPr lang="pt-BR" sz="1800" dirty="0">
               <a:latin typeface="Times" panose="02020603050405020304" pitchFamily="18" charset="0"/>
               <a:cs typeface="Times New Roman" panose="02020603050405020304" pitchFamily="18" charset="0"/>
             </a:endParaRPr>
@@ -8541,14 +8753,14 @@
               <a:buChar char="ü"/>
             </a:pPr>
             <a:r>
-              <a:rPr lang="pt-BR" sz="2000" dirty="0">
+              <a:rPr lang="pt-BR" sz="1800" dirty="0">
                 <a:latin typeface="Times" panose="02020603050405020304" pitchFamily="18" charset="0"/>
                 <a:cs typeface="Times New Roman" panose="02020603050405020304" pitchFamily="18" charset="0"/>
                 <a:hlinkClick r:id="rId8"/>
               </a:rPr>
               <a:t>https://www.fiap.com.br/shift/cursos-de-curta-duracao/</a:t>
             </a:r>
-            <a:endParaRPr lang="pt-BR" sz="2000" dirty="0">
+            <a:endParaRPr lang="pt-BR" sz="1800" dirty="0">
               <a:latin typeface="Times" panose="02020603050405020304" pitchFamily="18" charset="0"/>
               <a:cs typeface="Times New Roman" panose="02020603050405020304" pitchFamily="18" charset="0"/>
             </a:endParaRPr>
@@ -8559,14 +8771,14 @@
               <a:buChar char="ü"/>
             </a:pPr>
             <a:r>
-              <a:rPr lang="pt-BR" sz="2000" dirty="0">
+              <a:rPr lang="pt-BR" sz="1800" dirty="0">
                 <a:latin typeface="Times" panose="02020603050405020304" pitchFamily="18" charset="0"/>
                 <a:cs typeface="Times New Roman" panose="02020603050405020304" pitchFamily="18" charset="0"/>
                 <a:hlinkClick r:id="rId9"/>
               </a:rPr>
               <a:t>https://www.alura.com.br/</a:t>
             </a:r>
-            <a:endParaRPr lang="pt-BR" sz="2000" dirty="0">
+            <a:endParaRPr lang="pt-BR" sz="1800" dirty="0">
               <a:latin typeface="Times" panose="02020603050405020304" pitchFamily="18" charset="0"/>
               <a:cs typeface="Times New Roman" panose="02020603050405020304" pitchFamily="18" charset="0"/>
             </a:endParaRPr>
@@ -8577,14 +8789,14 @@
               <a:buChar char="ü"/>
             </a:pPr>
             <a:r>
-              <a:rPr lang="pt-BR" sz="2000" dirty="0">
+              <a:rPr lang="pt-BR" sz="1800" dirty="0">
                 <a:latin typeface="Times" panose="02020603050405020304" pitchFamily="18" charset="0"/>
                 <a:cs typeface="Times New Roman" panose="02020603050405020304" pitchFamily="18" charset="0"/>
                 <a:hlinkClick r:id="rId10"/>
               </a:rPr>
               <a:t>https://cognitiveclass.ai/courses</a:t>
             </a:r>
-            <a:endParaRPr lang="pt-BR" sz="2000" dirty="0">
+            <a:endParaRPr lang="pt-BR" sz="1800" dirty="0">
               <a:latin typeface="Times" panose="02020603050405020304" pitchFamily="18" charset="0"/>
               <a:cs typeface="Times New Roman" panose="02020603050405020304" pitchFamily="18" charset="0"/>
             </a:endParaRPr>
@@ -8595,17 +8807,70 @@
               <a:buChar char="ü"/>
             </a:pPr>
             <a:r>
-              <a:rPr lang="pt-BR" sz="2000" dirty="0">
+              <a:rPr lang="pt-BR" sz="1800" dirty="0">
                 <a:latin typeface="Times" panose="02020603050405020304" pitchFamily="18" charset="0"/>
                 <a:cs typeface="Times New Roman" panose="02020603050405020304" pitchFamily="18" charset="0"/>
                 <a:hlinkClick r:id="rId11"/>
               </a:rPr>
               <a:t>https://arden.ac.uk/berlin</a:t>
             </a:r>
-            <a:endParaRPr lang="pt-BR" sz="2000" dirty="0">
+            <a:endParaRPr lang="pt-BR" sz="1800" dirty="0">
               <a:latin typeface="Times" panose="02020603050405020304" pitchFamily="18" charset="0"/>
               <a:cs typeface="Times New Roman" panose="02020603050405020304" pitchFamily="18" charset="0"/>
             </a:endParaRPr>
+          </a:p>
+          <a:p>
+            <a:pPr algn="just">
+              <a:buFont typeface="Wingdings" panose="05000000000000000000" pitchFamily="2" charset="2"/>
+              <a:buChar char="ü"/>
+            </a:pPr>
+            <a:r>
+              <a:rPr lang="pt-BR" sz="1800" b="1" dirty="0">
+                <a:solidFill>
+                  <a:srgbClr val="FF0000"/>
+                </a:solidFill>
+                <a:latin typeface="Times" panose="02020603050405020304" pitchFamily="18" charset="0"/>
+                <a:cs typeface="Times New Roman" panose="02020603050405020304" pitchFamily="18" charset="0"/>
+                <a:hlinkClick r:id="rId12">
+                  <a:extLst>
+                    <a:ext uri="{A12FA001-AC4F-418D-AE19-62706E023703}">
+                      <ahyp:hlinkClr xmlns:ahyp="http://schemas.microsoft.com/office/drawing/2018/hyperlinkcolor" val="tx"/>
+                    </a:ext>
+                  </a:extLst>
+                </a:hlinkClick>
+              </a:rPr>
+              <a:t>https://learn.microsoft.com/pt-br/training/azure/</a:t>
+            </a:r>
+            <a:r>
+              <a:rPr lang="pt-BR" sz="1800" b="1" dirty="0">
+                <a:solidFill>
+                  <a:srgbClr val="FF0000"/>
+                </a:solidFill>
+                <a:latin typeface="Times" panose="02020603050405020304" pitchFamily="18" charset="0"/>
+                <a:cs typeface="Times New Roman" panose="02020603050405020304" pitchFamily="18" charset="0"/>
+              </a:rPr>
+              <a:t> (</a:t>
+            </a:r>
+            <a:r>
+              <a:rPr lang="pt-BR" sz="1800" b="1" dirty="0">
+                <a:solidFill>
+                  <a:srgbClr val="00B050"/>
+                </a:solidFill>
+                <a:latin typeface="Times" panose="02020603050405020304" pitchFamily="18" charset="0"/>
+                <a:cs typeface="Times New Roman" panose="02020603050405020304" pitchFamily="18" charset="0"/>
+              </a:rPr>
+              <a:t>Convênio Universitário</a:t>
+            </a:r>
+            <a:r>
+              <a:rPr lang="pt-BR" sz="1800" b="1" dirty="0">
+                <a:solidFill>
+                  <a:srgbClr val="FF0000"/>
+                </a:solidFill>
+                <a:latin typeface="Times" panose="02020603050405020304" pitchFamily="18" charset="0"/>
+                <a:cs typeface="Times New Roman" panose="02020603050405020304" pitchFamily="18" charset="0"/>
+              </a:rPr>
+              <a:t>)</a:t>
+            </a:r>
           </a:p>
         </p:txBody>
       </p:sp>
@@ -8663,12 +8928,20 @@
           <a:lstStyle/>
           <a:p>
             <a:r>
+              <a:rPr lang="en-US" b="1" dirty="0">
+                <a:solidFill>
+                  <a:srgbClr val="0070C0"/>
+                </a:solidFill>
+              </a:rPr>
+              <a:t>Ferramentas de </a:t>
+            </a:r>
+            <a:r>
               <a:rPr lang="en-US" b="1" dirty="0" err="1">
                 <a:solidFill>
                   <a:srgbClr val="0070C0"/>
                 </a:solidFill>
               </a:rPr>
-              <a:t>Leitura</a:t>
+              <a:t>Acesso</a:t>
             </a:r>
             <a:r>
               <a:rPr lang="en-US" b="1" dirty="0">
@@ -8684,7 +8957,7 @@
                   <a:srgbClr val="0070C0"/>
                 </a:solidFill>
               </a:rPr>
-              <a:t>Específica</a:t>
+              <a:t>Remoto</a:t>
             </a:r>
             <a:endParaRPr lang="en-US" b="1" dirty="0">
               <a:solidFill>
@@ -8706,8 +8979,8 @@
         </p:nvSpPr>
         <p:spPr>
           <a:xfrm>
-            <a:off x="142865" y="1200151"/>
-            <a:ext cx="8865056" cy="3394472"/>
+            <a:off x="142865" y="1200150"/>
+            <a:ext cx="8865056" cy="3737370"/>
           </a:xfrm>
         </p:spPr>
         <p:txBody>
@@ -8716,50 +8989,198 @@
           </a:bodyPr>
           <a:lstStyle/>
           <a:p>
-            <a:pPr marL="0" indent="0" algn="just">
-              <a:buNone/>
+            <a:pPr algn="just">
+              <a:buFont typeface="Wingdings" panose="05000000000000000000" pitchFamily="2" charset="2"/>
+              <a:buChar char="§"/>
             </a:pPr>
             <a:r>
-              <a:rPr lang="pt-BR" sz="2000" dirty="0">
-                <a:latin typeface="Times New Roman" panose="02020603050405020304" pitchFamily="18" charset="0"/>
-                <a:cs typeface="Times New Roman" panose="02020603050405020304" pitchFamily="18" charset="0"/>
-              </a:rPr>
-              <a:t>[1] Cloud Computer – Big Data.</a:t>
-            </a:r>
-          </a:p>
-          <a:p>
-            <a:pPr marL="0" indent="0" algn="just">
-              <a:buNone/>
-            </a:pPr>
-            <a:r>
-              <a:rPr lang="pt-BR" sz="2000" b="1" dirty="0">
-                <a:solidFill>
-                  <a:srgbClr val="FF0000"/>
-                </a:solidFill>
-                <a:latin typeface="Times New Roman" panose="02020603050405020304" pitchFamily="18" charset="0"/>
-                <a:cs typeface="Times New Roman" panose="02020603050405020304" pitchFamily="18" charset="0"/>
-              </a:rPr>
-              <a:t>Disponível em: </a:t>
-            </a:r>
-            <a:r>
-              <a:rPr lang="pt-BR" sz="2000" dirty="0">
-                <a:latin typeface="Times New Roman" panose="02020603050405020304" pitchFamily="18" charset="0"/>
-                <a:cs typeface="Times New Roman" panose="02020603050405020304" pitchFamily="18" charset="0"/>
-                <a:hlinkClick r:id="rId3"/>
-              </a:rPr>
-              <a:t>https://academics.uccs.edu/~ooluwada/courses/datamining/ExtraReading/Big_data_A_review.pdf</a:t>
+              <a:rPr lang="pt-BR" sz="2000" dirty="0" err="1">
+                <a:latin typeface="Times" panose="02020603050405020304" pitchFamily="18" charset="0"/>
+                <a:cs typeface="Times New Roman" panose="02020603050405020304" pitchFamily="18" charset="0"/>
+              </a:rPr>
+              <a:t>TeamViewer</a:t>
             </a:r>
             <a:endParaRPr lang="pt-BR" sz="2000" dirty="0">
-              <a:latin typeface="Times New Roman" panose="02020603050405020304" pitchFamily="18" charset="0"/>
+              <a:latin typeface="Times" panose="02020603050405020304" pitchFamily="18" charset="0"/>
               <a:cs typeface="Times New Roman" panose="02020603050405020304" pitchFamily="18" charset="0"/>
             </a:endParaRPr>
           </a:p>
           <a:p>
+            <a:pPr algn="just">
+              <a:buFont typeface="Wingdings" panose="05000000000000000000" pitchFamily="2" charset="2"/>
+              <a:buChar char="§"/>
+            </a:pPr>
+            <a:r>
+              <a:rPr lang="pt-BR" sz="2000" dirty="0" err="1">
+                <a:latin typeface="Times" panose="02020603050405020304" pitchFamily="18" charset="0"/>
+                <a:cs typeface="Times New Roman" panose="02020603050405020304" pitchFamily="18" charset="0"/>
+              </a:rPr>
+              <a:t>AnyDesk</a:t>
+            </a:r>
+            <a:r>
+              <a:rPr lang="pt-BR" sz="2000" dirty="0">
+                <a:latin typeface="Times" panose="02020603050405020304" pitchFamily="18" charset="0"/>
+                <a:cs typeface="Times New Roman" panose="02020603050405020304" pitchFamily="18" charset="0"/>
+              </a:rPr>
+              <a:t> /  </a:t>
+            </a:r>
+            <a:r>
+              <a:rPr lang="pt-BR" sz="2000" dirty="0" err="1">
+                <a:latin typeface="Times" panose="02020603050405020304" pitchFamily="18" charset="0"/>
+                <a:cs typeface="Times New Roman" panose="02020603050405020304" pitchFamily="18" charset="0"/>
+              </a:rPr>
+              <a:t>Showmypc</a:t>
+            </a:r>
+            <a:endParaRPr lang="pt-BR" sz="2000" dirty="0">
+              <a:latin typeface="Times" panose="02020603050405020304" pitchFamily="18" charset="0"/>
+              <a:cs typeface="Times New Roman" panose="02020603050405020304" pitchFamily="18" charset="0"/>
+            </a:endParaRPr>
+          </a:p>
+          <a:p>
+            <a:pPr algn="just">
+              <a:buFont typeface="Wingdings" panose="05000000000000000000" pitchFamily="2" charset="2"/>
+              <a:buChar char="§"/>
+            </a:pPr>
+            <a:r>
+              <a:rPr lang="pt-BR" sz="2000" dirty="0" err="1">
+                <a:latin typeface="Times" panose="02020603050405020304" pitchFamily="18" charset="0"/>
+                <a:cs typeface="Times New Roman" panose="02020603050405020304" pitchFamily="18" charset="0"/>
+              </a:rPr>
+              <a:t>LogMeIn</a:t>
+            </a:r>
+            <a:endParaRPr lang="pt-BR" sz="2000" dirty="0">
+              <a:latin typeface="Times" panose="02020603050405020304" pitchFamily="18" charset="0"/>
+              <a:cs typeface="Times New Roman" panose="02020603050405020304" pitchFamily="18" charset="0"/>
+            </a:endParaRPr>
+          </a:p>
+          <a:p>
+            <a:pPr algn="just">
+              <a:buFont typeface="Wingdings" panose="05000000000000000000" pitchFamily="2" charset="2"/>
+              <a:buChar char="§"/>
+            </a:pPr>
+            <a:r>
+              <a:rPr lang="pt-BR" sz="2000" dirty="0" err="1">
+                <a:latin typeface="Times" panose="02020603050405020304" pitchFamily="18" charset="0"/>
+                <a:cs typeface="Times New Roman" panose="02020603050405020304" pitchFamily="18" charset="0"/>
+              </a:rPr>
+              <a:t>AeroAdmin</a:t>
+            </a:r>
+            <a:r>
+              <a:rPr lang="pt-BR" sz="2000" dirty="0">
+                <a:latin typeface="Times" panose="02020603050405020304" pitchFamily="18" charset="0"/>
+                <a:cs typeface="Times New Roman" panose="02020603050405020304" pitchFamily="18" charset="0"/>
+              </a:rPr>
+              <a:t> (</a:t>
+            </a:r>
+            <a:r>
+              <a:rPr lang="pt-BR" sz="2000" b="1" dirty="0">
+                <a:solidFill>
+                  <a:srgbClr val="FF0000"/>
+                </a:solidFill>
+                <a:latin typeface="Times" panose="02020603050405020304" pitchFamily="18" charset="0"/>
+                <a:cs typeface="Times New Roman" panose="02020603050405020304" pitchFamily="18" charset="0"/>
+              </a:rPr>
+              <a:t>Nunca utilizei</a:t>
+            </a:r>
+            <a:r>
+              <a:rPr lang="pt-BR" sz="2000" dirty="0">
+                <a:latin typeface="Times" panose="02020603050405020304" pitchFamily="18" charset="0"/>
+                <a:cs typeface="Times New Roman" panose="02020603050405020304" pitchFamily="18" charset="0"/>
+              </a:rPr>
+              <a:t>)</a:t>
+            </a:r>
+          </a:p>
+          <a:p>
+            <a:pPr algn="just">
+              <a:buFont typeface="Wingdings" panose="05000000000000000000" pitchFamily="2" charset="2"/>
+              <a:buChar char="§"/>
+            </a:pPr>
+            <a:r>
+              <a:rPr lang="pt-BR" sz="2000" dirty="0" err="1">
+                <a:latin typeface="Times" panose="02020603050405020304" pitchFamily="18" charset="0"/>
+                <a:cs typeface="Times New Roman" panose="02020603050405020304" pitchFamily="18" charset="0"/>
+              </a:rPr>
+              <a:t>Chorme</a:t>
+            </a:r>
+            <a:r>
+              <a:rPr lang="pt-BR" sz="2000" dirty="0">
+                <a:latin typeface="Times" panose="02020603050405020304" pitchFamily="18" charset="0"/>
+                <a:cs typeface="Times New Roman" panose="02020603050405020304" pitchFamily="18" charset="0"/>
+              </a:rPr>
+              <a:t> Remote Desktop (</a:t>
+            </a:r>
+            <a:r>
+              <a:rPr lang="pt-BR" sz="2000" dirty="0">
+                <a:latin typeface="Times" panose="02020603050405020304" pitchFamily="18" charset="0"/>
+                <a:cs typeface="Times New Roman" panose="02020603050405020304" pitchFamily="18" charset="0"/>
+                <a:hlinkClick r:id="rId3"/>
+              </a:rPr>
+              <a:t>https://remotedesktop.google.com</a:t>
+            </a:r>
+            <a:r>
+              <a:rPr lang="pt-BR" sz="2000" dirty="0">
+                <a:latin typeface="Times" panose="02020603050405020304" pitchFamily="18" charset="0"/>
+                <a:cs typeface="Times New Roman" panose="02020603050405020304" pitchFamily="18" charset="0"/>
+              </a:rPr>
+              <a:t>), </a:t>
+            </a:r>
+            <a:r>
+              <a:rPr lang="pt-BR" sz="2000" b="1" dirty="0">
+                <a:solidFill>
+                  <a:srgbClr val="FF0000"/>
+                </a:solidFill>
+                <a:latin typeface="Times" panose="02020603050405020304" pitchFamily="18" charset="0"/>
+                <a:cs typeface="Times New Roman" panose="02020603050405020304" pitchFamily="18" charset="0"/>
+              </a:rPr>
+              <a:t>existe extensão</a:t>
+            </a:r>
+            <a:r>
+              <a:rPr lang="pt-BR" sz="2000" dirty="0">
+                <a:latin typeface="Times" panose="02020603050405020304" pitchFamily="18" charset="0"/>
+                <a:cs typeface="Times New Roman" panose="02020603050405020304" pitchFamily="18" charset="0"/>
+              </a:rPr>
+              <a:t>.</a:t>
+            </a:r>
+          </a:p>
+          <a:p>
+            <a:pPr algn="just">
+              <a:buFont typeface="Wingdings" panose="05000000000000000000" pitchFamily="2" charset="2"/>
+              <a:buChar char="§"/>
+            </a:pPr>
+            <a:r>
+              <a:rPr lang="pt-BR" sz="2000" dirty="0" err="1">
+                <a:latin typeface="Times" panose="02020603050405020304" pitchFamily="18" charset="0"/>
+                <a:cs typeface="Times New Roman" panose="02020603050405020304" pitchFamily="18" charset="0"/>
+              </a:rPr>
+              <a:t>Radmin</a:t>
+            </a:r>
+            <a:r>
+              <a:rPr lang="pt-BR" sz="2000" dirty="0">
+                <a:latin typeface="Times" panose="02020603050405020304" pitchFamily="18" charset="0"/>
+                <a:cs typeface="Times New Roman" panose="02020603050405020304" pitchFamily="18" charset="0"/>
+              </a:rPr>
+              <a:t> VPN</a:t>
+            </a:r>
+          </a:p>
+          <a:p>
+            <a:pPr algn="just">
+              <a:buFont typeface="Wingdings" panose="05000000000000000000" pitchFamily="2" charset="2"/>
+              <a:buChar char="§"/>
+            </a:pPr>
+            <a:r>
+              <a:rPr lang="pt-BR" sz="2000" dirty="0">
+                <a:latin typeface="Times" panose="02020603050405020304" pitchFamily="18" charset="0"/>
+                <a:cs typeface="Times New Roman" panose="02020603050405020304" pitchFamily="18" charset="0"/>
+              </a:rPr>
+              <a:t>VPN Windows</a:t>
+            </a:r>
+          </a:p>
+          <a:p>
             <a:pPr marL="0" indent="0" algn="just">
               <a:buNone/>
             </a:pPr>
             <a:endParaRPr lang="pt-BR" sz="2000" dirty="0">
-              <a:latin typeface="Times New Roman" panose="02020603050405020304" pitchFamily="18" charset="0"/>
+              <a:latin typeface="Times" panose="02020603050405020304" pitchFamily="18" charset="0"/>
               <a:cs typeface="Times New Roman" panose="02020603050405020304" pitchFamily="18" charset="0"/>
             </a:endParaRPr>
           </a:p>
@@ -8769,36 +9190,24 @@
             </a:pPr>
             <a:r>
               <a:rPr lang="pt-BR" sz="2000" dirty="0">
-                <a:latin typeface="Times New Roman" panose="02020603050405020304" pitchFamily="18" charset="0"/>
-                <a:cs typeface="Times New Roman" panose="02020603050405020304" pitchFamily="18" charset="0"/>
-              </a:rPr>
-              <a:t>[1] Cloud Computer – Big Data.</a:t>
-            </a:r>
+                <a:latin typeface="Times" panose="02020603050405020304" pitchFamily="18" charset="0"/>
+                <a:cs typeface="Times New Roman" panose="02020603050405020304" pitchFamily="18" charset="0"/>
+                <a:hlinkClick r:id="rId4"/>
+              </a:rPr>
+              <a:t>https://www.topgadget.com.br/howto/tech/15-melhores-ferramentas-de-acesso-remoto-gratis.htm/amp</a:t>
+            </a:r>
+            <a:endParaRPr lang="pt-BR" sz="2000" dirty="0">
+              <a:latin typeface="Times" panose="02020603050405020304" pitchFamily="18" charset="0"/>
+              <a:cs typeface="Times New Roman" panose="02020603050405020304" pitchFamily="18" charset="0"/>
+            </a:endParaRPr>
           </a:p>
           <a:p>
             <a:pPr marL="0" indent="0" algn="just">
               <a:buNone/>
             </a:pPr>
-            <a:r>
-              <a:rPr lang="pt-BR" sz="2000" b="1" dirty="0">
-                <a:solidFill>
-                  <a:srgbClr val="FF0000"/>
-                </a:solidFill>
-                <a:latin typeface="Times New Roman" panose="02020603050405020304" pitchFamily="18" charset="0"/>
-                <a:cs typeface="Times New Roman" panose="02020603050405020304" pitchFamily="18" charset="0"/>
-              </a:rPr>
-              <a:t>Disponível em: </a:t>
-            </a:r>
-            <a:r>
-              <a:rPr lang="pt-BR" sz="2000" dirty="0">
-                <a:latin typeface="Times New Roman" panose="02020603050405020304" pitchFamily="18" charset="0"/>
-                <a:cs typeface="Times New Roman" panose="02020603050405020304" pitchFamily="18" charset="0"/>
-                <a:hlinkClick r:id="rId4"/>
-              </a:rPr>
-              <a:t>https://www.researchgate.net/profile/Allae-Erraissi/publication/319935616_A_Big_Data_Hadoop_building_blocks_comparative_study/links/5a3944750f7e9b0499773117/A-Big-Data-Hadoop-building-blocks-comparative-study.pdf</a:t>
-            </a:r>
             <a:endParaRPr lang="pt-BR" sz="2000" dirty="0">
-              <a:latin typeface="Calibri" panose="020F0502020204030204" pitchFamily="34" charset="0"/>
+              <a:latin typeface="Times" panose="02020603050405020304" pitchFamily="18" charset="0"/>
+              <a:cs typeface="Times New Roman" panose="02020603050405020304" pitchFamily="18" charset="0"/>
             </a:endParaRPr>
           </a:p>
         </p:txBody>
@@ -8806,7 +9215,7 @@
     </p:spTree>
     <p:extLst>
       <p:ext uri="{BB962C8B-B14F-4D97-AF65-F5344CB8AC3E}">
-        <p14:creationId xmlns:p14="http://schemas.microsoft.com/office/powerpoint/2010/main" val="3680270425"/>
+        <p14:creationId xmlns:p14="http://schemas.microsoft.com/office/powerpoint/2010/main" val="1916022966"/>
       </p:ext>
     </p:extLst>
   </p:cSld>
@@ -8918,44 +9327,35 @@
                 <a:latin typeface="Times New Roman" panose="02020603050405020304" pitchFamily="18" charset="0"/>
                 <a:cs typeface="Times New Roman" panose="02020603050405020304" pitchFamily="18" charset="0"/>
               </a:rPr>
-              <a:t>[1] Cloud Computer – Computação Cognitiva (</a:t>
-            </a:r>
+              <a:t>[1] Cloud Computer – Big Data.</a:t>
+            </a:r>
+          </a:p>
+          <a:p>
+            <a:pPr marL="0" indent="0" algn="just">
+              <a:buNone/>
+            </a:pPr>
             <a:r>
               <a:rPr lang="pt-BR" sz="2000" b="1" dirty="0">
-                <a:latin typeface="Times New Roman" panose="02020603050405020304" pitchFamily="18" charset="0"/>
-                <a:cs typeface="Times New Roman" panose="02020603050405020304" pitchFamily="18" charset="0"/>
-              </a:rPr>
-              <a:t>Computação Cognitiva: resultados de uma pesquisa experimental e aplicada em um ambiente virtual de aprendizado (AVA)</a:t>
+                <a:solidFill>
+                  <a:srgbClr val="FF0000"/>
+                </a:solidFill>
+                <a:latin typeface="Times New Roman" panose="02020603050405020304" pitchFamily="18" charset="0"/>
+                <a:cs typeface="Times New Roman" panose="02020603050405020304" pitchFamily="18" charset="0"/>
+              </a:rPr>
+              <a:t>Disponível em: </a:t>
             </a:r>
             <a:r>
               <a:rPr lang="pt-BR" sz="2000" dirty="0">
                 <a:latin typeface="Times New Roman" panose="02020603050405020304" pitchFamily="18" charset="0"/>
                 <a:cs typeface="Times New Roman" panose="02020603050405020304" pitchFamily="18" charset="0"/>
-              </a:rPr>
-              <a:t>)</a:t>
-            </a:r>
-          </a:p>
-          <a:p>
-            <a:pPr marL="0" indent="0" algn="just">
-              <a:buNone/>
-            </a:pPr>
-            <a:r>
-              <a:rPr lang="pt-BR" sz="2000" b="1" dirty="0">
-                <a:solidFill>
-                  <a:srgbClr val="FF0000"/>
-                </a:solidFill>
-                <a:latin typeface="Times New Roman" panose="02020603050405020304" pitchFamily="18" charset="0"/>
-                <a:cs typeface="Times New Roman" panose="02020603050405020304" pitchFamily="18" charset="0"/>
-              </a:rPr>
-              <a:t>Disponível em: </a:t>
-            </a:r>
-            <a:r>
-              <a:rPr lang="pt-BR" sz="2000" dirty="0">
-                <a:latin typeface="Times New Roman" panose="02020603050405020304" pitchFamily="18" charset="0"/>
-                <a:cs typeface="Times New Roman" panose="02020603050405020304" pitchFamily="18" charset="0"/>
-              </a:rPr>
-              <a:t>https://shre.ink/cI6J</a:t>
-            </a:r>
+                <a:hlinkClick r:id="rId3"/>
+              </a:rPr>
+              <a:t>https://academics.uccs.edu/~ooluwada/courses/datamining/ExtraReading/Big_data_A_review.pdf</a:t>
+            </a:r>
+            <a:endParaRPr lang="pt-BR" sz="2000" dirty="0">
+              <a:latin typeface="Times New Roman" panose="02020603050405020304" pitchFamily="18" charset="0"/>
+              <a:cs typeface="Times New Roman" panose="02020603050405020304" pitchFamily="18" charset="0"/>
+            </a:endParaRPr>
           </a:p>
           <a:p>
             <a:pPr marL="0" indent="0" algn="just">
@@ -8975,7 +9375,7 @@
                 <a:latin typeface="Times New Roman" panose="02020603050405020304" pitchFamily="18" charset="0"/>
                 <a:cs typeface="Times New Roman" panose="02020603050405020304" pitchFamily="18" charset="0"/>
               </a:rPr>
-              <a:t>[2] Cloud Computer – Computação Cognitiva. </a:t>
+              <a:t>[2] Cloud Computer – Big Data.</a:t>
             </a:r>
           </a:p>
           <a:p>
@@ -8996,55 +9396,10 @@
               <a:rPr lang="pt-BR" sz="2000" dirty="0">
                 <a:latin typeface="Times New Roman" panose="02020603050405020304" pitchFamily="18" charset="0"/>
                 <a:cs typeface="Times New Roman" panose="02020603050405020304" pitchFamily="18" charset="0"/>
-                <a:hlinkClick r:id="rId3"/>
-              </a:rPr>
-              <a:t>https://revista.ibict.br/fiinf/article/view/5260</a:t>
-            </a:r>
-            <a:endParaRPr lang="pt-BR" sz="2000" dirty="0">
-              <a:latin typeface="Times New Roman" panose="02020603050405020304" pitchFamily="18" charset="0"/>
-              <a:cs typeface="Times New Roman" panose="02020603050405020304" pitchFamily="18" charset="0"/>
-            </a:endParaRPr>
-          </a:p>
-          <a:p>
-            <a:pPr marL="0" indent="0" algn="just">
-              <a:buNone/>
-            </a:pPr>
-            <a:endParaRPr lang="pt-BR" sz="2000" dirty="0">
-              <a:latin typeface="Times New Roman" panose="02020603050405020304" pitchFamily="18" charset="0"/>
-              <a:cs typeface="Times New Roman" panose="02020603050405020304" pitchFamily="18" charset="0"/>
-            </a:endParaRPr>
-          </a:p>
-          <a:p>
-            <a:pPr marL="0" indent="0" algn="just">
-              <a:buNone/>
-            </a:pPr>
-            <a:endParaRPr lang="pt-BR" sz="2000" dirty="0">
-              <a:latin typeface="Times New Roman" panose="02020603050405020304" pitchFamily="18" charset="0"/>
-              <a:cs typeface="Times New Roman" panose="02020603050405020304" pitchFamily="18" charset="0"/>
-            </a:endParaRPr>
-          </a:p>
-          <a:p>
-            <a:pPr marL="0" indent="0" algn="just">
-              <a:buNone/>
-            </a:pPr>
-            <a:endParaRPr lang="pt-BR" sz="2000" dirty="0">
-              <a:latin typeface="Times New Roman" panose="02020603050405020304" pitchFamily="18" charset="0"/>
-              <a:cs typeface="Times New Roman" panose="02020603050405020304" pitchFamily="18" charset="0"/>
-            </a:endParaRPr>
-          </a:p>
-          <a:p>
-            <a:pPr marL="0" indent="0" algn="just">
-              <a:buNone/>
-            </a:pPr>
-            <a:endParaRPr lang="pt-BR" sz="2000" dirty="0">
-              <a:latin typeface="Times New Roman" panose="02020603050405020304" pitchFamily="18" charset="0"/>
-              <a:cs typeface="Times New Roman" panose="02020603050405020304" pitchFamily="18" charset="0"/>
-            </a:endParaRPr>
-          </a:p>
-          <a:p>
-            <a:pPr marL="0" indent="0" algn="just">
-              <a:buNone/>
-            </a:pPr>
+                <a:hlinkClick r:id="rId4"/>
+              </a:rPr>
+              <a:t>https://www.researchgate.net/profile/Allae-Erraissi/publication/319935616_A_Big_Data_Hadoop_building_blocks_comparative_study/links/5a3944750f7e9b0499773117/A-Big-Data-Hadoop-building-blocks-comparative-study.pdf</a:t>
+            </a:r>
             <a:endParaRPr lang="pt-BR" sz="2000" dirty="0">
               <a:latin typeface="Calibri" panose="020F0502020204030204" pitchFamily="34" charset="0"/>
             </a:endParaRPr>
@@ -9054,7 +9409,7 @@
     </p:spTree>
     <p:extLst>
       <p:ext uri="{BB962C8B-B14F-4D97-AF65-F5344CB8AC3E}">
-        <p14:creationId xmlns:p14="http://schemas.microsoft.com/office/powerpoint/2010/main" val="4175167667"/>
+        <p14:creationId xmlns:p14="http://schemas.microsoft.com/office/powerpoint/2010/main" val="3680270425"/>
       </p:ext>
     </p:extLst>
   </p:cSld>

</xml_diff>